<commit_message>
Update images in DeveloperGuide
</commit_message>
<xml_diff>
--- a/docs/diagrams/UiComponentClassDiagram.pptx
+++ b/docs/diagrams/UiComponentClassDiagram.pptx
@@ -208,7 +208,7 @@
           <a:p>
             <a:fld id="{F5CC4B3F-88C1-4FFA-B1B6-F41C21DC6924}" type="datetimeFigureOut">
               <a:rPr lang="en-US" smtClean="0"/>
-              <a:t>3/10/2017</a:t>
+              <a:t>3/11/2017</a:t>
             </a:fld>
             <a:endParaRPr lang="en-US"/>
           </a:p>
@@ -654,7 +654,7 @@
           <a:p>
             <a:fld id="{78C97017-6FC3-485B-9764-EAC9E56C1D49}" type="datetimeFigureOut">
               <a:rPr lang="en-US" smtClean="0"/>
-              <a:t>3/10/2017</a:t>
+              <a:t>3/11/2017</a:t>
             </a:fld>
             <a:endParaRPr lang="en-US"/>
           </a:p>
@@ -822,7 +822,7 @@
           <a:p>
             <a:fld id="{78C97017-6FC3-485B-9764-EAC9E56C1D49}" type="datetimeFigureOut">
               <a:rPr lang="en-US" smtClean="0"/>
-              <a:t>3/10/2017</a:t>
+              <a:t>3/11/2017</a:t>
             </a:fld>
             <a:endParaRPr lang="en-US"/>
           </a:p>
@@ -1000,7 +1000,7 @@
           <a:p>
             <a:fld id="{78C97017-6FC3-485B-9764-EAC9E56C1D49}" type="datetimeFigureOut">
               <a:rPr lang="en-US" smtClean="0"/>
-              <a:t>3/10/2017</a:t>
+              <a:t>3/11/2017</a:t>
             </a:fld>
             <a:endParaRPr lang="en-US"/>
           </a:p>
@@ -1168,7 +1168,7 @@
           <a:p>
             <a:fld id="{78C97017-6FC3-485B-9764-EAC9E56C1D49}" type="datetimeFigureOut">
               <a:rPr lang="en-US" smtClean="0"/>
-              <a:t>3/10/2017</a:t>
+              <a:t>3/11/2017</a:t>
             </a:fld>
             <a:endParaRPr lang="en-US"/>
           </a:p>
@@ -1413,7 +1413,7 @@
           <a:p>
             <a:fld id="{78C97017-6FC3-485B-9764-EAC9E56C1D49}" type="datetimeFigureOut">
               <a:rPr lang="en-US" smtClean="0"/>
-              <a:t>3/10/2017</a:t>
+              <a:t>3/11/2017</a:t>
             </a:fld>
             <a:endParaRPr lang="en-US"/>
           </a:p>
@@ -1698,7 +1698,7 @@
           <a:p>
             <a:fld id="{78C97017-6FC3-485B-9764-EAC9E56C1D49}" type="datetimeFigureOut">
               <a:rPr lang="en-US" smtClean="0"/>
-              <a:t>3/10/2017</a:t>
+              <a:t>3/11/2017</a:t>
             </a:fld>
             <a:endParaRPr lang="en-US"/>
           </a:p>
@@ -2117,7 +2117,7 @@
           <a:p>
             <a:fld id="{78C97017-6FC3-485B-9764-EAC9E56C1D49}" type="datetimeFigureOut">
               <a:rPr lang="en-US" smtClean="0"/>
-              <a:t>3/10/2017</a:t>
+              <a:t>3/11/2017</a:t>
             </a:fld>
             <a:endParaRPr lang="en-US"/>
           </a:p>
@@ -2234,7 +2234,7 @@
           <a:p>
             <a:fld id="{78C97017-6FC3-485B-9764-EAC9E56C1D49}" type="datetimeFigureOut">
               <a:rPr lang="en-US" smtClean="0"/>
-              <a:t>3/10/2017</a:t>
+              <a:t>3/11/2017</a:t>
             </a:fld>
             <a:endParaRPr lang="en-US"/>
           </a:p>
@@ -2329,7 +2329,7 @@
           <a:p>
             <a:fld id="{78C97017-6FC3-485B-9764-EAC9E56C1D49}" type="datetimeFigureOut">
               <a:rPr lang="en-US" smtClean="0"/>
-              <a:t>3/10/2017</a:t>
+              <a:t>3/11/2017</a:t>
             </a:fld>
             <a:endParaRPr lang="en-US"/>
           </a:p>
@@ -2604,7 +2604,7 @@
           <a:p>
             <a:fld id="{78C97017-6FC3-485B-9764-EAC9E56C1D49}" type="datetimeFigureOut">
               <a:rPr lang="en-US" smtClean="0"/>
-              <a:t>3/10/2017</a:t>
+              <a:t>3/11/2017</a:t>
             </a:fld>
             <a:endParaRPr lang="en-US"/>
           </a:p>
@@ -2856,7 +2856,7 @@
           <a:p>
             <a:fld id="{78C97017-6FC3-485B-9764-EAC9E56C1D49}" type="datetimeFigureOut">
               <a:rPr lang="en-US" smtClean="0"/>
-              <a:t>3/10/2017</a:t>
+              <a:t>3/11/2017</a:t>
             </a:fld>
             <a:endParaRPr lang="en-US"/>
           </a:p>
@@ -3067,7 +3067,7 @@
           <a:p>
             <a:fld id="{78C97017-6FC3-485B-9764-EAC9E56C1D49}" type="datetimeFigureOut">
               <a:rPr lang="en-US" smtClean="0"/>
-              <a:t>3/10/2017</a:t>
+              <a:t>3/11/2017</a:t>
             </a:fld>
             <a:endParaRPr lang="en-US"/>
           </a:p>

</xml_diff>

<commit_message>
Edit UI class diagram
</commit_message>
<xml_diff>
--- a/docs/diagrams/UiComponentClassDiagram.pptx
+++ b/docs/diagrams/UiComponentClassDiagram.pptx
@@ -208,7 +208,7 @@
           <a:p>
             <a:fld id="{F5CC4B3F-88C1-4FFA-B1B6-F41C21DC6924}" type="datetimeFigureOut">
               <a:rPr lang="en-US" smtClean="0"/>
-              <a:t>3/14/2017</a:t>
+              <a:t>3/23/2017</a:t>
             </a:fld>
             <a:endParaRPr lang="en-US"/>
           </a:p>
@@ -654,7 +654,7 @@
           <a:p>
             <a:fld id="{78C97017-6FC3-485B-9764-EAC9E56C1D49}" type="datetimeFigureOut">
               <a:rPr lang="en-US" smtClean="0"/>
-              <a:t>3/14/2017</a:t>
+              <a:t>3/23/2017</a:t>
             </a:fld>
             <a:endParaRPr lang="en-US"/>
           </a:p>
@@ -822,7 +822,7 @@
           <a:p>
             <a:fld id="{78C97017-6FC3-485B-9764-EAC9E56C1D49}" type="datetimeFigureOut">
               <a:rPr lang="en-US" smtClean="0"/>
-              <a:t>3/14/2017</a:t>
+              <a:t>3/23/2017</a:t>
             </a:fld>
             <a:endParaRPr lang="en-US"/>
           </a:p>
@@ -1000,7 +1000,7 @@
           <a:p>
             <a:fld id="{78C97017-6FC3-485B-9764-EAC9E56C1D49}" type="datetimeFigureOut">
               <a:rPr lang="en-US" smtClean="0"/>
-              <a:t>3/14/2017</a:t>
+              <a:t>3/23/2017</a:t>
             </a:fld>
             <a:endParaRPr lang="en-US"/>
           </a:p>
@@ -1168,7 +1168,7 @@
           <a:p>
             <a:fld id="{78C97017-6FC3-485B-9764-EAC9E56C1D49}" type="datetimeFigureOut">
               <a:rPr lang="en-US" smtClean="0"/>
-              <a:t>3/14/2017</a:t>
+              <a:t>3/23/2017</a:t>
             </a:fld>
             <a:endParaRPr lang="en-US"/>
           </a:p>
@@ -1413,7 +1413,7 @@
           <a:p>
             <a:fld id="{78C97017-6FC3-485B-9764-EAC9E56C1D49}" type="datetimeFigureOut">
               <a:rPr lang="en-US" smtClean="0"/>
-              <a:t>3/14/2017</a:t>
+              <a:t>3/23/2017</a:t>
             </a:fld>
             <a:endParaRPr lang="en-US"/>
           </a:p>
@@ -1698,7 +1698,7 @@
           <a:p>
             <a:fld id="{78C97017-6FC3-485B-9764-EAC9E56C1D49}" type="datetimeFigureOut">
               <a:rPr lang="en-US" smtClean="0"/>
-              <a:t>3/14/2017</a:t>
+              <a:t>3/23/2017</a:t>
             </a:fld>
             <a:endParaRPr lang="en-US"/>
           </a:p>
@@ -2117,7 +2117,7 @@
           <a:p>
             <a:fld id="{78C97017-6FC3-485B-9764-EAC9E56C1D49}" type="datetimeFigureOut">
               <a:rPr lang="en-US" smtClean="0"/>
-              <a:t>3/14/2017</a:t>
+              <a:t>3/23/2017</a:t>
             </a:fld>
             <a:endParaRPr lang="en-US"/>
           </a:p>
@@ -2234,7 +2234,7 @@
           <a:p>
             <a:fld id="{78C97017-6FC3-485B-9764-EAC9E56C1D49}" type="datetimeFigureOut">
               <a:rPr lang="en-US" smtClean="0"/>
-              <a:t>3/14/2017</a:t>
+              <a:t>3/23/2017</a:t>
             </a:fld>
             <a:endParaRPr lang="en-US"/>
           </a:p>
@@ -2329,7 +2329,7 @@
           <a:p>
             <a:fld id="{78C97017-6FC3-485B-9764-EAC9E56C1D49}" type="datetimeFigureOut">
               <a:rPr lang="en-US" smtClean="0"/>
-              <a:t>3/14/2017</a:t>
+              <a:t>3/23/2017</a:t>
             </a:fld>
             <a:endParaRPr lang="en-US"/>
           </a:p>
@@ -2604,7 +2604,7 @@
           <a:p>
             <a:fld id="{78C97017-6FC3-485B-9764-EAC9E56C1D49}" type="datetimeFigureOut">
               <a:rPr lang="en-US" smtClean="0"/>
-              <a:t>3/14/2017</a:t>
+              <a:t>3/23/2017</a:t>
             </a:fld>
             <a:endParaRPr lang="en-US"/>
           </a:p>
@@ -2856,7 +2856,7 @@
           <a:p>
             <a:fld id="{78C97017-6FC3-485B-9764-EAC9E56C1D49}" type="datetimeFigureOut">
               <a:rPr lang="en-US" smtClean="0"/>
-              <a:t>3/14/2017</a:t>
+              <a:t>3/23/2017</a:t>
             </a:fld>
             <a:endParaRPr lang="en-US"/>
           </a:p>
@@ -3067,7 +3067,7 @@
           <a:p>
             <a:fld id="{78C97017-6FC3-485B-9764-EAC9E56C1D49}" type="datetimeFigureOut">
               <a:rPr lang="en-US" smtClean="0"/>
-              <a:t>3/14/2017</a:t>
+              <a:t>3/23/2017</a:t>
             </a:fld>
             <a:endParaRPr lang="en-US"/>
           </a:p>
@@ -3572,7 +3572,7 @@
         </p:nvSpPr>
         <p:spPr>
           <a:xfrm>
-            <a:off x="2592528" y="2971800"/>
+            <a:off x="2590864" y="2802705"/>
             <a:ext cx="1093635" cy="236841"/>
           </a:xfrm>
           <a:prstGeom prst="rect">
@@ -3825,8 +3825,8 @@
         </p:nvSpPr>
         <p:spPr>
           <a:xfrm rot="16200000">
-            <a:off x="5897462" y="2271239"/>
-            <a:ext cx="1974933" cy="328045"/>
+            <a:off x="5669380" y="2512908"/>
+            <a:ext cx="2458267" cy="328045"/>
           </a:xfrm>
           <a:prstGeom prst="roundRect">
             <a:avLst/>
@@ -3885,7 +3885,7 @@
         </p:nvSpPr>
         <p:spPr>
           <a:xfrm>
-            <a:off x="2592528" y="3649359"/>
+            <a:off x="2600654" y="3736004"/>
             <a:ext cx="1093635" cy="236841"/>
           </a:xfrm>
           <a:prstGeom prst="rect">
@@ -3945,7 +3945,7 @@
         </p:nvSpPr>
         <p:spPr>
           <a:xfrm>
-            <a:off x="2592527" y="4563759"/>
+            <a:off x="2593947" y="4722222"/>
             <a:ext cx="1093635" cy="236841"/>
           </a:xfrm>
           <a:prstGeom prst="rect">
@@ -4005,7 +4005,7 @@
         </p:nvSpPr>
         <p:spPr>
           <a:xfrm>
-            <a:off x="2592526" y="3991960"/>
+            <a:off x="2607360" y="4052051"/>
             <a:ext cx="1093635" cy="236841"/>
           </a:xfrm>
           <a:prstGeom prst="rect">
@@ -4045,17 +4045,7 @@
                   </a:schemeClr>
                 </a:solidFill>
               </a:rPr>
-              <a:t>Task</a:t>
-            </a:r>
-            <a:r>
-              <a:rPr lang="en-US" sz="1050" b="1" dirty="0" smtClean="0">
-                <a:solidFill>
-                  <a:schemeClr val="accent3">
-                    <a:lumMod val="75000"/>
-                  </a:schemeClr>
-                </a:solidFill>
-              </a:rPr>
-              <a:t>ListPanel</a:t>
+              <a:t>TaskListPanel</a:t>
             </a:r>
             <a:endParaRPr lang="en-SG" sz="1050" b="1" dirty="0">
               <a:solidFill>
@@ -4075,7 +4065,7 @@
         </p:nvSpPr>
         <p:spPr>
           <a:xfrm>
-            <a:off x="3839323" y="4228801"/>
+            <a:off x="3878817" y="4224324"/>
             <a:ext cx="1040906" cy="236841"/>
           </a:xfrm>
           <a:prstGeom prst="rect">
@@ -4115,17 +4105,7 @@
                   </a:schemeClr>
                 </a:solidFill>
               </a:rPr>
-              <a:t>Task</a:t>
-            </a:r>
-            <a:r>
-              <a:rPr lang="en-US" sz="1050" b="1" dirty="0" smtClean="0">
-                <a:solidFill>
-                  <a:schemeClr val="accent3">
-                    <a:lumMod val="75000"/>
-                  </a:schemeClr>
-                </a:solidFill>
-              </a:rPr>
-              <a:t>Card</a:t>
+              <a:t>TaskCard</a:t>
             </a:r>
             <a:endParaRPr lang="en-SG" sz="1050" b="1" dirty="0">
               <a:solidFill>
@@ -4196,8 +4176,8 @@
         </p:nvCxnSpPr>
         <p:spPr>
           <a:xfrm rot="16200000" flipH="1">
-            <a:off x="2393229" y="2890922"/>
-            <a:ext cx="222196" cy="176402"/>
+            <a:off x="2476945" y="2807206"/>
+            <a:ext cx="53101" cy="174738"/>
           </a:xfrm>
           <a:prstGeom prst="bentConnector2">
             <a:avLst/>
@@ -4234,7 +4214,7 @@
         </p:nvSpPr>
         <p:spPr>
           <a:xfrm>
-            <a:off x="2590799" y="3304308"/>
+            <a:off x="2594735" y="3116952"/>
             <a:ext cx="1095361" cy="236841"/>
           </a:xfrm>
           <a:prstGeom prst="rect">
@@ -4297,8 +4277,8 @@
         </p:nvCxnSpPr>
         <p:spPr>
           <a:xfrm rot="16200000" flipH="1">
-            <a:off x="2054450" y="3229701"/>
-            <a:ext cx="899755" cy="176402"/>
+            <a:off x="2015190" y="3268961"/>
+            <a:ext cx="986400" cy="184528"/>
           </a:xfrm>
           <a:prstGeom prst="bentConnector2">
             <a:avLst/>
@@ -4338,8 +4318,8 @@
         </p:nvCxnSpPr>
         <p:spPr>
           <a:xfrm rot="16200000" flipH="1">
-            <a:off x="1883148" y="3401003"/>
-            <a:ext cx="1242356" cy="176400"/>
+            <a:off x="1860520" y="3423631"/>
+            <a:ext cx="1302447" cy="191234"/>
           </a:xfrm>
           <a:prstGeom prst="bentConnector2">
             <a:avLst/>
@@ -4376,12 +4356,12 @@
         </p:nvCxnSpPr>
         <p:spPr>
           <a:xfrm rot="16200000" flipH="1">
-            <a:off x="1388065" y="3477980"/>
-            <a:ext cx="1994458" cy="414462"/>
+            <a:off x="1314479" y="3561574"/>
+            <a:ext cx="2166475" cy="419286"/>
           </a:xfrm>
           <a:prstGeom prst="bentConnector3">
             <a:avLst>
-              <a:gd name="adj1" fmla="val 99985"/>
+              <a:gd name="adj1" fmla="val 99954"/>
             </a:avLst>
           </a:prstGeom>
           <a:ln w="19050">
@@ -4498,8 +4478,8 @@
         </p:nvCxnSpPr>
         <p:spPr>
           <a:xfrm flipV="1">
-            <a:off x="3686160" y="2286000"/>
-            <a:ext cx="1843809" cy="1136729"/>
+            <a:off x="3690096" y="2286000"/>
+            <a:ext cx="1839873" cy="949373"/>
           </a:xfrm>
           <a:prstGeom prst="bentConnector2">
             <a:avLst/>
@@ -4539,8 +4519,8 @@
         </p:nvCxnSpPr>
         <p:spPr>
           <a:xfrm rot="5400000">
-            <a:off x="4174488" y="2991741"/>
-            <a:ext cx="2061222" cy="649740"/>
+            <a:off x="4196474" y="3009249"/>
+            <a:ext cx="2056745" cy="610246"/>
           </a:xfrm>
           <a:prstGeom prst="bentConnector2">
             <a:avLst/>
@@ -4580,8 +4560,8 @@
         </p:nvCxnSpPr>
         <p:spPr>
           <a:xfrm rot="5400000">
-            <a:off x="3867176" y="2104987"/>
-            <a:ext cx="1481780" cy="1843806"/>
+            <a:off x="3827917" y="2152372"/>
+            <a:ext cx="1568425" cy="1835680"/>
           </a:xfrm>
           <a:prstGeom prst="bentConnector2">
             <a:avLst/>
@@ -4659,7 +4639,7 @@
         </p:nvCxnSpPr>
         <p:spPr>
           <a:xfrm rot="5400000">
-            <a:off x="3409976" y="2562188"/>
+            <a:off x="3414169" y="2734461"/>
             <a:ext cx="2396180" cy="1843807"/>
           </a:xfrm>
           <a:prstGeom prst="bentConnector2">
@@ -4738,8 +4718,8 @@
         </p:nvSpPr>
         <p:spPr>
           <a:xfrm rot="16200000">
-            <a:off x="6175639" y="4141276"/>
-            <a:ext cx="1447799" cy="328045"/>
+            <a:off x="6410965" y="4376601"/>
+            <a:ext cx="977147" cy="328045"/>
           </a:xfrm>
           <a:prstGeom prst="roundRect">
             <a:avLst/>
@@ -4845,7 +4825,7 @@
           <a:p>
             <a:pPr algn="ctr"/>
             <a:r>
-              <a:rPr lang="en-US" sz="1050" dirty="0" err="1">
+              <a:rPr lang="en-US" sz="1050" dirty="0">
                 <a:solidFill>
                   <a:schemeClr val="bg1"/>
                 </a:solidFill>
@@ -4961,8 +4941,8 @@
         </p:nvCxnSpPr>
         <p:spPr>
           <a:xfrm rot="16200000" flipH="1">
-            <a:off x="2226110" y="3058040"/>
-            <a:ext cx="554704" cy="174673"/>
+            <a:off x="2321756" y="2962394"/>
+            <a:ext cx="367348" cy="178609"/>
           </a:xfrm>
           <a:prstGeom prst="bentConnector2">
             <a:avLst/>
@@ -5002,8 +4982,8 @@
         </p:nvCxnSpPr>
         <p:spPr>
           <a:xfrm rot="5400000">
-            <a:off x="4205956" y="1766207"/>
-            <a:ext cx="804221" cy="1843806"/>
+            <a:off x="4289671" y="1680828"/>
+            <a:ext cx="635126" cy="1845470"/>
           </a:xfrm>
           <a:prstGeom prst="bentConnector2">
             <a:avLst/>
@@ -5043,8 +5023,8 @@
         </p:nvCxnSpPr>
         <p:spPr>
           <a:xfrm rot="16200000" flipH="1">
-            <a:off x="3430123" y="3938021"/>
-            <a:ext cx="118421" cy="699979"/>
+            <a:off x="3489571" y="3953498"/>
+            <a:ext cx="53853" cy="724639"/>
           </a:xfrm>
           <a:prstGeom prst="bentConnector2">
             <a:avLst/>
@@ -5084,8 +5064,8 @@
         </p:nvCxnSpPr>
         <p:spPr>
           <a:xfrm rot="5400000">
-            <a:off x="3695875" y="2276286"/>
-            <a:ext cx="1824381" cy="1843808"/>
+            <a:off x="3673246" y="2313749"/>
+            <a:ext cx="1884472" cy="1828974"/>
           </a:xfrm>
           <a:prstGeom prst="bentConnector2">
             <a:avLst/>
@@ -5175,7 +5155,7 @@
         </p:nvSpPr>
         <p:spPr>
           <a:xfrm>
-            <a:off x="3687515" y="2828802"/>
+            <a:off x="3687516" y="2709035"/>
             <a:ext cx="3048000" cy="203200"/>
           </a:xfrm>
           <a:custGeom>
@@ -5310,7 +5290,7 @@
         </p:nvSpPr>
         <p:spPr>
           <a:xfrm flipV="1">
-            <a:off x="4114799" y="4472708"/>
+            <a:off x="4110475" y="4462439"/>
             <a:ext cx="2642195" cy="101600"/>
           </a:xfrm>
           <a:custGeom>
@@ -5356,6 +5336,332 @@
               <a:schemeClr val="accent3"/>
             </a:solidFill>
             <a:prstDash val="sysDot"/>
+            <a:headEnd type="none" w="med" len="med"/>
+            <a:tailEnd type="arrow" w="med" len="med"/>
+          </a:ln>
+          <a:effectLst/>
+        </p:spPr>
+        <p:style>
+          <a:lnRef idx="1">
+            <a:schemeClr val="accent2"/>
+          </a:lnRef>
+          <a:fillRef idx="2">
+            <a:schemeClr val="accent2"/>
+          </a:fillRef>
+          <a:effectRef idx="1">
+            <a:schemeClr val="accent2"/>
+          </a:effectRef>
+          <a:fontRef idx="minor">
+            <a:schemeClr val="dk1"/>
+          </a:fontRef>
+        </p:style>
+        <p:txBody>
+          <a:bodyPr rtlCol="0" anchor="ctr"/>
+          <a:lstStyle/>
+          <a:p>
+            <a:pPr algn="ctr"/>
+            <a:endParaRPr lang="en-SG"/>
+          </a:p>
+        </p:txBody>
+      </p:sp>
+      <p:cxnSp>
+        <p:nvCxnSpPr>
+          <p:cNvPr id="54" name="Elbow Connector 63"/>
+          <p:cNvCxnSpPr>
+            <a:stCxn id="39" idx="2"/>
+          </p:cNvCxnSpPr>
+          <p:nvPr/>
+        </p:nvCxnSpPr>
+        <p:spPr>
+          <a:xfrm rot="16200000" flipH="1">
+            <a:off x="1680920" y="3603231"/>
+            <a:ext cx="1658370" cy="187958"/>
+          </a:xfrm>
+          <a:prstGeom prst="bentConnector3">
+            <a:avLst>
+              <a:gd name="adj1" fmla="val 100009"/>
+            </a:avLst>
+          </a:prstGeom>
+          <a:ln w="19050">
+            <a:solidFill>
+              <a:schemeClr val="accent3"/>
+            </a:solidFill>
+            <a:headEnd type="none" w="med" len="med"/>
+            <a:tailEnd type="arrow" w="med" len="med"/>
+          </a:ln>
+          <a:effectLst/>
+        </p:spPr>
+        <p:style>
+          <a:lnRef idx="1">
+            <a:schemeClr val="accent2"/>
+          </a:lnRef>
+          <a:fillRef idx="2">
+            <a:schemeClr val="accent2"/>
+          </a:fillRef>
+          <a:effectRef idx="1">
+            <a:schemeClr val="accent2"/>
+          </a:effectRef>
+          <a:fontRef idx="minor">
+            <a:schemeClr val="dk1"/>
+          </a:fontRef>
+        </p:style>
+      </p:cxnSp>
+      <p:sp>
+        <p:nvSpPr>
+          <p:cNvPr id="55" name="Rectangle 11"/>
+          <p:cNvSpPr/>
+          <p:nvPr/>
+        </p:nvSpPr>
+        <p:spPr>
+          <a:xfrm>
+            <a:off x="2600654" y="4404033"/>
+            <a:ext cx="1093635" cy="236841"/>
+          </a:xfrm>
+          <a:prstGeom prst="rect">
+            <a:avLst/>
+          </a:prstGeom>
+          <a:ln w="19050">
+            <a:solidFill>
+              <a:schemeClr val="accent3"/>
+            </a:solidFill>
+          </a:ln>
+          <a:effectLst/>
+        </p:spPr>
+        <p:style>
+          <a:lnRef idx="1">
+            <a:schemeClr val="accent3"/>
+          </a:lnRef>
+          <a:fillRef idx="2">
+            <a:schemeClr val="accent3"/>
+          </a:fillRef>
+          <a:effectRef idx="1">
+            <a:schemeClr val="accent3"/>
+          </a:effectRef>
+          <a:fontRef idx="minor">
+            <a:schemeClr val="dk1"/>
+          </a:fontRef>
+        </p:style>
+        <p:txBody>
+          <a:bodyPr rtlCol="0" anchor="ctr"/>
+          <a:lstStyle/>
+          <a:p>
+            <a:pPr algn="ctr"/>
+            <a:r>
+              <a:rPr lang="en-US" sz="1050" b="1" dirty="0" smtClean="0">
+                <a:solidFill>
+                  <a:schemeClr val="accent3">
+                    <a:lumMod val="75000"/>
+                  </a:schemeClr>
+                </a:solidFill>
+              </a:rPr>
+              <a:t>TaskListType</a:t>
+            </a:r>
+            <a:endParaRPr lang="en-SG" sz="1050" b="1" dirty="0">
+              <a:solidFill>
+                <a:schemeClr val="accent3">
+                  <a:lumMod val="75000"/>
+                </a:schemeClr>
+              </a:solidFill>
+            </a:endParaRPr>
+          </a:p>
+        </p:txBody>
+      </p:sp>
+      <p:sp>
+        <p:nvSpPr>
+          <p:cNvPr id="78" name="Rectangle 11"/>
+          <p:cNvSpPr/>
+          <p:nvPr/>
+        </p:nvSpPr>
+        <p:spPr>
+          <a:xfrm>
+            <a:off x="2590013" y="3426884"/>
+            <a:ext cx="1093635" cy="236841"/>
+          </a:xfrm>
+          <a:prstGeom prst="rect">
+            <a:avLst/>
+          </a:prstGeom>
+          <a:ln w="19050">
+            <a:solidFill>
+              <a:schemeClr val="accent3"/>
+            </a:solidFill>
+          </a:ln>
+          <a:effectLst/>
+        </p:spPr>
+        <p:style>
+          <a:lnRef idx="1">
+            <a:schemeClr val="accent3"/>
+          </a:lnRef>
+          <a:fillRef idx="2">
+            <a:schemeClr val="accent3"/>
+          </a:fillRef>
+          <a:effectRef idx="1">
+            <a:schemeClr val="accent3"/>
+          </a:effectRef>
+          <a:fontRef idx="minor">
+            <a:schemeClr val="dk1"/>
+          </a:fontRef>
+        </p:style>
+        <p:txBody>
+          <a:bodyPr rtlCol="0" anchor="ctr"/>
+          <a:lstStyle/>
+          <a:p>
+            <a:pPr algn="ctr"/>
+            <a:r>
+              <a:rPr lang="en-US" sz="1050" b="1" dirty="0" smtClean="0">
+                <a:solidFill>
+                  <a:schemeClr val="accent3">
+                    <a:lumMod val="75000"/>
+                  </a:schemeClr>
+                </a:solidFill>
+              </a:rPr>
+              <a:t>TaskCount</a:t>
+            </a:r>
+            <a:endParaRPr lang="en-SG" sz="1050" b="1" dirty="0">
+              <a:solidFill>
+                <a:schemeClr val="accent3">
+                  <a:lumMod val="75000"/>
+                </a:schemeClr>
+              </a:solidFill>
+            </a:endParaRPr>
+          </a:p>
+        </p:txBody>
+      </p:sp>
+      <p:cxnSp>
+        <p:nvCxnSpPr>
+          <p:cNvPr id="79" name="Elbow Connector 78"/>
+          <p:cNvCxnSpPr>
+            <a:stCxn id="39" idx="2"/>
+          </p:cNvCxnSpPr>
+          <p:nvPr/>
+        </p:nvCxnSpPr>
+        <p:spPr>
+          <a:xfrm rot="16200000" flipH="1">
+            <a:off x="2157126" y="3127025"/>
+            <a:ext cx="700148" cy="182148"/>
+          </a:xfrm>
+          <a:prstGeom prst="bentConnector3">
+            <a:avLst>
+              <a:gd name="adj1" fmla="val 100114"/>
+            </a:avLst>
+          </a:prstGeom>
+          <a:ln w="19050">
+            <a:solidFill>
+              <a:schemeClr val="accent3"/>
+            </a:solidFill>
+            <a:headEnd type="none" w="med" len="med"/>
+            <a:tailEnd type="arrow" w="med" len="med"/>
+          </a:ln>
+          <a:effectLst/>
+        </p:spPr>
+        <p:style>
+          <a:lnRef idx="1">
+            <a:schemeClr val="accent2"/>
+          </a:lnRef>
+          <a:fillRef idx="2">
+            <a:schemeClr val="accent2"/>
+          </a:fillRef>
+          <a:effectRef idx="1">
+            <a:schemeClr val="accent2"/>
+          </a:effectRef>
+          <a:fontRef idx="minor">
+            <a:schemeClr val="dk1"/>
+          </a:fontRef>
+        </p:style>
+      </p:cxnSp>
+      <p:cxnSp>
+        <p:nvCxnSpPr>
+          <p:cNvPr id="81" name="Elbow Connector 63"/>
+          <p:cNvCxnSpPr>
+            <a:endCxn id="16" idx="3"/>
+          </p:cNvCxnSpPr>
+          <p:nvPr/>
+        </p:nvCxnSpPr>
+        <p:spPr>
+          <a:xfrm flipV="1">
+            <a:off x="3687181" y="2286000"/>
+            <a:ext cx="1842788" cy="1282174"/>
+          </a:xfrm>
+          <a:prstGeom prst="bentConnector2">
+            <a:avLst/>
+          </a:prstGeom>
+          <a:ln w="6350">
+            <a:solidFill>
+              <a:schemeClr val="accent3"/>
+            </a:solidFill>
+            <a:headEnd type="none" w="med" len="med"/>
+            <a:tailEnd type="none" w="med" len="med"/>
+          </a:ln>
+          <a:effectLst/>
+        </p:spPr>
+        <p:style>
+          <a:lnRef idx="1">
+            <a:schemeClr val="accent2"/>
+          </a:lnRef>
+          <a:fillRef idx="2">
+            <a:schemeClr val="accent2"/>
+          </a:fillRef>
+          <a:effectRef idx="1">
+            <a:schemeClr val="accent2"/>
+          </a:effectRef>
+          <a:fontRef idx="minor">
+            <a:schemeClr val="dk1"/>
+          </a:fontRef>
+        </p:style>
+      </p:cxnSp>
+      <p:sp>
+        <p:nvSpPr>
+          <p:cNvPr id="83" name="Freeform 82"/>
+          <p:cNvSpPr/>
+          <p:nvPr/>
+        </p:nvSpPr>
+        <p:spPr>
+          <a:xfrm>
+            <a:off x="3686491" y="3371357"/>
+            <a:ext cx="3048000" cy="203200"/>
+          </a:xfrm>
+          <a:custGeom>
+            <a:avLst/>
+            <a:gdLst>
+              <a:gd name="connsiteX0" fmla="*/ 0 w 3048000"/>
+              <a:gd name="connsiteY0" fmla="*/ 203200 h 203200"/>
+              <a:gd name="connsiteX1" fmla="*/ 221673 w 3048000"/>
+              <a:gd name="connsiteY1" fmla="*/ 0 h 203200"/>
+              <a:gd name="connsiteX2" fmla="*/ 3048000 w 3048000"/>
+              <a:gd name="connsiteY2" fmla="*/ 0 h 203200"/>
+            </a:gdLst>
+            <a:ahLst/>
+            <a:cxnLst>
+              <a:cxn ang="0">
+                <a:pos x="connsiteX0" y="connsiteY0"/>
+              </a:cxn>
+              <a:cxn ang="0">
+                <a:pos x="connsiteX1" y="connsiteY1"/>
+              </a:cxn>
+              <a:cxn ang="0">
+                <a:pos x="connsiteX2" y="connsiteY2"/>
+              </a:cxn>
+            </a:cxnLst>
+            <a:rect l="l" t="t" r="r" b="b"/>
+            <a:pathLst>
+              <a:path w="3048000" h="203200">
+                <a:moveTo>
+                  <a:pt x="0" y="203200"/>
+                </a:moveTo>
+                <a:lnTo>
+                  <a:pt x="221673" y="0"/>
+                </a:lnTo>
+                <a:lnTo>
+                  <a:pt x="3048000" y="0"/>
+                </a:lnTo>
+              </a:path>
+            </a:pathLst>
+          </a:custGeom>
+          <a:noFill/>
+          <a:ln w="19050">
+            <a:solidFill>
+              <a:schemeClr val="accent3"/>
+            </a:solidFill>
+            <a:prstDash val="solid"/>
             <a:headEnd type="none" w="med" len="med"/>
             <a:tailEnd type="arrow" w="med" len="med"/>
           </a:ln>

</xml_diff>

<commit_message>
change personcard to taskcard
</commit_message>
<xml_diff>
--- a/docs/diagrams/UiComponentClassDiagram.pptx
+++ b/docs/diagrams/UiComponentClassDiagram.pptx
@@ -109,7 +109,7 @@
   </p:defaultTextStyle>
   <p:extLst>
     <p:ext uri="{EFAFB233-063F-42B5-8137-9DF3F51BA10A}">
-      <p15:sldGuideLst xmlns:p15="http://schemas.microsoft.com/office/powerpoint/2012/main">
+      <p15:sldGuideLst xmlns:p15="http://schemas.microsoft.com/office/powerpoint/2012/main" xmlns="">
         <p15:guide id="1" orient="horz" pos="1488">
           <p15:clr>
             <a:srgbClr val="A4A3A4"/>
@@ -208,7 +208,8 @@
           <a:p>
             <a:fld id="{F5CC4B3F-88C1-4FFA-B1B6-F41C21DC6924}" type="datetimeFigureOut">
               <a:rPr lang="en-US" smtClean="0"/>
-              <a:t>1/7/2017</a:t>
+              <a:pPr/>
+              <a:t>3/23/2017</a:t>
             </a:fld>
             <a:endParaRPr lang="en-US"/>
           </a:p>
@@ -366,6 +367,7 @@
           <a:p>
             <a:fld id="{5A7AB025-77E3-4BD1-A2FD-B3183DBA47A3}" type="slidenum">
               <a:rPr lang="en-US" smtClean="0"/>
+              <a:pPr/>
               <a:t>‹#›</a:t>
             </a:fld>
             <a:endParaRPr lang="en-US"/>
@@ -375,7 +377,7 @@
     </p:spTree>
     <p:extLst>
       <p:ext uri="{BB962C8B-B14F-4D97-AF65-F5344CB8AC3E}">
-        <p14:creationId xmlns:p14="http://schemas.microsoft.com/office/powerpoint/2010/main" val="2023976206"/>
+        <p14:creationId xmlns:p14="http://schemas.microsoft.com/office/powerpoint/2010/main" xmlns="" val="2023976206"/>
       </p:ext>
     </p:extLst>
   </p:cSld>
@@ -654,7 +656,8 @@
           <a:p>
             <a:fld id="{78C97017-6FC3-485B-9764-EAC9E56C1D49}" type="datetimeFigureOut">
               <a:rPr lang="en-US" smtClean="0"/>
-              <a:t>1/7/2017</a:t>
+              <a:pPr/>
+              <a:t>3/23/2017</a:t>
             </a:fld>
             <a:endParaRPr lang="en-US"/>
           </a:p>
@@ -696,6 +699,7 @@
           <a:p>
             <a:fld id="{FB34683C-161B-4520-BF45-B179E228CF2A}" type="slidenum">
               <a:rPr lang="en-US" smtClean="0"/>
+              <a:pPr/>
               <a:t>‹#›</a:t>
             </a:fld>
             <a:endParaRPr lang="en-US"/>
@@ -705,7 +709,7 @@
     </p:spTree>
     <p:extLst>
       <p:ext uri="{BB962C8B-B14F-4D97-AF65-F5344CB8AC3E}">
-        <p14:creationId xmlns:p14="http://schemas.microsoft.com/office/powerpoint/2010/main" val="3246593157"/>
+        <p14:creationId xmlns:p14="http://schemas.microsoft.com/office/powerpoint/2010/main" xmlns="" val="3246593157"/>
       </p:ext>
     </p:extLst>
   </p:cSld>
@@ -822,7 +826,8 @@
           <a:p>
             <a:fld id="{78C97017-6FC3-485B-9764-EAC9E56C1D49}" type="datetimeFigureOut">
               <a:rPr lang="en-US" smtClean="0"/>
-              <a:t>1/7/2017</a:t>
+              <a:pPr/>
+              <a:t>3/23/2017</a:t>
             </a:fld>
             <a:endParaRPr lang="en-US"/>
           </a:p>
@@ -864,6 +869,7 @@
           <a:p>
             <a:fld id="{FB34683C-161B-4520-BF45-B179E228CF2A}" type="slidenum">
               <a:rPr lang="en-US" smtClean="0"/>
+              <a:pPr/>
               <a:t>‹#›</a:t>
             </a:fld>
             <a:endParaRPr lang="en-US"/>
@@ -873,7 +879,7 @@
     </p:spTree>
     <p:extLst>
       <p:ext uri="{BB962C8B-B14F-4D97-AF65-F5344CB8AC3E}">
-        <p14:creationId xmlns:p14="http://schemas.microsoft.com/office/powerpoint/2010/main" val="2707025021"/>
+        <p14:creationId xmlns:p14="http://schemas.microsoft.com/office/powerpoint/2010/main" xmlns="" val="2707025021"/>
       </p:ext>
     </p:extLst>
   </p:cSld>
@@ -1000,7 +1006,8 @@
           <a:p>
             <a:fld id="{78C97017-6FC3-485B-9764-EAC9E56C1D49}" type="datetimeFigureOut">
               <a:rPr lang="en-US" smtClean="0"/>
-              <a:t>1/7/2017</a:t>
+              <a:pPr/>
+              <a:t>3/23/2017</a:t>
             </a:fld>
             <a:endParaRPr lang="en-US"/>
           </a:p>
@@ -1042,6 +1049,7 @@
           <a:p>
             <a:fld id="{FB34683C-161B-4520-BF45-B179E228CF2A}" type="slidenum">
               <a:rPr lang="en-US" smtClean="0"/>
+              <a:pPr/>
               <a:t>‹#›</a:t>
             </a:fld>
             <a:endParaRPr lang="en-US"/>
@@ -1051,7 +1059,7 @@
     </p:spTree>
     <p:extLst>
       <p:ext uri="{BB962C8B-B14F-4D97-AF65-F5344CB8AC3E}">
-        <p14:creationId xmlns:p14="http://schemas.microsoft.com/office/powerpoint/2010/main" val="568378986"/>
+        <p14:creationId xmlns:p14="http://schemas.microsoft.com/office/powerpoint/2010/main" xmlns="" val="568378986"/>
       </p:ext>
     </p:extLst>
   </p:cSld>
@@ -1168,7 +1176,8 @@
           <a:p>
             <a:fld id="{78C97017-6FC3-485B-9764-EAC9E56C1D49}" type="datetimeFigureOut">
               <a:rPr lang="en-US" smtClean="0"/>
-              <a:t>1/7/2017</a:t>
+              <a:pPr/>
+              <a:t>3/23/2017</a:t>
             </a:fld>
             <a:endParaRPr lang="en-US"/>
           </a:p>
@@ -1210,6 +1219,7 @@
           <a:p>
             <a:fld id="{FB34683C-161B-4520-BF45-B179E228CF2A}" type="slidenum">
               <a:rPr lang="en-US" smtClean="0"/>
+              <a:pPr/>
               <a:t>‹#›</a:t>
             </a:fld>
             <a:endParaRPr lang="en-US"/>
@@ -1219,7 +1229,7 @@
     </p:spTree>
     <p:extLst>
       <p:ext uri="{BB962C8B-B14F-4D97-AF65-F5344CB8AC3E}">
-        <p14:creationId xmlns:p14="http://schemas.microsoft.com/office/powerpoint/2010/main" val="266658052"/>
+        <p14:creationId xmlns:p14="http://schemas.microsoft.com/office/powerpoint/2010/main" xmlns="" val="266658052"/>
       </p:ext>
     </p:extLst>
   </p:cSld>
@@ -1413,7 +1423,8 @@
           <a:p>
             <a:fld id="{78C97017-6FC3-485B-9764-EAC9E56C1D49}" type="datetimeFigureOut">
               <a:rPr lang="en-US" smtClean="0"/>
-              <a:t>1/7/2017</a:t>
+              <a:pPr/>
+              <a:t>3/23/2017</a:t>
             </a:fld>
             <a:endParaRPr lang="en-US"/>
           </a:p>
@@ -1455,6 +1466,7 @@
           <a:p>
             <a:fld id="{FB34683C-161B-4520-BF45-B179E228CF2A}" type="slidenum">
               <a:rPr lang="en-US" smtClean="0"/>
+              <a:pPr/>
               <a:t>‹#›</a:t>
             </a:fld>
             <a:endParaRPr lang="en-US"/>
@@ -1464,7 +1476,7 @@
     </p:spTree>
     <p:extLst>
       <p:ext uri="{BB962C8B-B14F-4D97-AF65-F5344CB8AC3E}">
-        <p14:creationId xmlns:p14="http://schemas.microsoft.com/office/powerpoint/2010/main" val="474686344"/>
+        <p14:creationId xmlns:p14="http://schemas.microsoft.com/office/powerpoint/2010/main" xmlns="" val="474686344"/>
       </p:ext>
     </p:extLst>
   </p:cSld>
@@ -1698,7 +1710,8 @@
           <a:p>
             <a:fld id="{78C97017-6FC3-485B-9764-EAC9E56C1D49}" type="datetimeFigureOut">
               <a:rPr lang="en-US" smtClean="0"/>
-              <a:t>1/7/2017</a:t>
+              <a:pPr/>
+              <a:t>3/23/2017</a:t>
             </a:fld>
             <a:endParaRPr lang="en-US"/>
           </a:p>
@@ -1740,6 +1753,7 @@
           <a:p>
             <a:fld id="{FB34683C-161B-4520-BF45-B179E228CF2A}" type="slidenum">
               <a:rPr lang="en-US" smtClean="0"/>
+              <a:pPr/>
               <a:t>‹#›</a:t>
             </a:fld>
             <a:endParaRPr lang="en-US"/>
@@ -1749,7 +1763,7 @@
     </p:spTree>
     <p:extLst>
       <p:ext uri="{BB962C8B-B14F-4D97-AF65-F5344CB8AC3E}">
-        <p14:creationId xmlns:p14="http://schemas.microsoft.com/office/powerpoint/2010/main" val="562293251"/>
+        <p14:creationId xmlns:p14="http://schemas.microsoft.com/office/powerpoint/2010/main" xmlns="" val="562293251"/>
       </p:ext>
     </p:extLst>
   </p:cSld>
@@ -2117,7 +2131,8 @@
           <a:p>
             <a:fld id="{78C97017-6FC3-485B-9764-EAC9E56C1D49}" type="datetimeFigureOut">
               <a:rPr lang="en-US" smtClean="0"/>
-              <a:t>1/7/2017</a:t>
+              <a:pPr/>
+              <a:t>3/23/2017</a:t>
             </a:fld>
             <a:endParaRPr lang="en-US"/>
           </a:p>
@@ -2159,6 +2174,7 @@
           <a:p>
             <a:fld id="{FB34683C-161B-4520-BF45-B179E228CF2A}" type="slidenum">
               <a:rPr lang="en-US" smtClean="0"/>
+              <a:pPr/>
               <a:t>‹#›</a:t>
             </a:fld>
             <a:endParaRPr lang="en-US"/>
@@ -2168,7 +2184,7 @@
     </p:spTree>
     <p:extLst>
       <p:ext uri="{BB962C8B-B14F-4D97-AF65-F5344CB8AC3E}">
-        <p14:creationId xmlns:p14="http://schemas.microsoft.com/office/powerpoint/2010/main" val="1126424250"/>
+        <p14:creationId xmlns:p14="http://schemas.microsoft.com/office/powerpoint/2010/main" xmlns="" val="1126424250"/>
       </p:ext>
     </p:extLst>
   </p:cSld>
@@ -2234,7 +2250,8 @@
           <a:p>
             <a:fld id="{78C97017-6FC3-485B-9764-EAC9E56C1D49}" type="datetimeFigureOut">
               <a:rPr lang="en-US" smtClean="0"/>
-              <a:t>1/7/2017</a:t>
+              <a:pPr/>
+              <a:t>3/23/2017</a:t>
             </a:fld>
             <a:endParaRPr lang="en-US"/>
           </a:p>
@@ -2276,6 +2293,7 @@
           <a:p>
             <a:fld id="{FB34683C-161B-4520-BF45-B179E228CF2A}" type="slidenum">
               <a:rPr lang="en-US" smtClean="0"/>
+              <a:pPr/>
               <a:t>‹#›</a:t>
             </a:fld>
             <a:endParaRPr lang="en-US"/>
@@ -2285,7 +2303,7 @@
     </p:spTree>
     <p:extLst>
       <p:ext uri="{BB962C8B-B14F-4D97-AF65-F5344CB8AC3E}">
-        <p14:creationId xmlns:p14="http://schemas.microsoft.com/office/powerpoint/2010/main" val="4159724230"/>
+        <p14:creationId xmlns:p14="http://schemas.microsoft.com/office/powerpoint/2010/main" xmlns="" val="4159724230"/>
       </p:ext>
     </p:extLst>
   </p:cSld>
@@ -2329,7 +2347,8 @@
           <a:p>
             <a:fld id="{78C97017-6FC3-485B-9764-EAC9E56C1D49}" type="datetimeFigureOut">
               <a:rPr lang="en-US" smtClean="0"/>
-              <a:t>1/7/2017</a:t>
+              <a:pPr/>
+              <a:t>3/23/2017</a:t>
             </a:fld>
             <a:endParaRPr lang="en-US"/>
           </a:p>
@@ -2371,6 +2390,7 @@
           <a:p>
             <a:fld id="{FB34683C-161B-4520-BF45-B179E228CF2A}" type="slidenum">
               <a:rPr lang="en-US" smtClean="0"/>
+              <a:pPr/>
               <a:t>‹#›</a:t>
             </a:fld>
             <a:endParaRPr lang="en-US"/>
@@ -2380,7 +2400,7 @@
     </p:spTree>
     <p:extLst>
       <p:ext uri="{BB962C8B-B14F-4D97-AF65-F5344CB8AC3E}">
-        <p14:creationId xmlns:p14="http://schemas.microsoft.com/office/powerpoint/2010/main" val="1793928710"/>
+        <p14:creationId xmlns:p14="http://schemas.microsoft.com/office/powerpoint/2010/main" xmlns="" val="1793928710"/>
       </p:ext>
     </p:extLst>
   </p:cSld>
@@ -2604,7 +2624,8 @@
           <a:p>
             <a:fld id="{78C97017-6FC3-485B-9764-EAC9E56C1D49}" type="datetimeFigureOut">
               <a:rPr lang="en-US" smtClean="0"/>
-              <a:t>1/7/2017</a:t>
+              <a:pPr/>
+              <a:t>3/23/2017</a:t>
             </a:fld>
             <a:endParaRPr lang="en-US"/>
           </a:p>
@@ -2646,6 +2667,7 @@
           <a:p>
             <a:fld id="{FB34683C-161B-4520-BF45-B179E228CF2A}" type="slidenum">
               <a:rPr lang="en-US" smtClean="0"/>
+              <a:pPr/>
               <a:t>‹#›</a:t>
             </a:fld>
             <a:endParaRPr lang="en-US"/>
@@ -2655,7 +2677,7 @@
     </p:spTree>
     <p:extLst>
       <p:ext uri="{BB962C8B-B14F-4D97-AF65-F5344CB8AC3E}">
-        <p14:creationId xmlns:p14="http://schemas.microsoft.com/office/powerpoint/2010/main" val="2076802089"/>
+        <p14:creationId xmlns:p14="http://schemas.microsoft.com/office/powerpoint/2010/main" xmlns="" val="2076802089"/>
       </p:ext>
     </p:extLst>
   </p:cSld>
@@ -2856,7 +2878,8 @@
           <a:p>
             <a:fld id="{78C97017-6FC3-485B-9764-EAC9E56C1D49}" type="datetimeFigureOut">
               <a:rPr lang="en-US" smtClean="0"/>
-              <a:t>1/7/2017</a:t>
+              <a:pPr/>
+              <a:t>3/23/2017</a:t>
             </a:fld>
             <a:endParaRPr lang="en-US"/>
           </a:p>
@@ -2898,6 +2921,7 @@
           <a:p>
             <a:fld id="{FB34683C-161B-4520-BF45-B179E228CF2A}" type="slidenum">
               <a:rPr lang="en-US" smtClean="0"/>
+              <a:pPr/>
               <a:t>‹#›</a:t>
             </a:fld>
             <a:endParaRPr lang="en-US"/>
@@ -2907,7 +2931,7 @@
     </p:spTree>
     <p:extLst>
       <p:ext uri="{BB962C8B-B14F-4D97-AF65-F5344CB8AC3E}">
-        <p14:creationId xmlns:p14="http://schemas.microsoft.com/office/powerpoint/2010/main" val="201835938"/>
+        <p14:creationId xmlns:p14="http://schemas.microsoft.com/office/powerpoint/2010/main" xmlns="" val="201835938"/>
       </p:ext>
     </p:extLst>
   </p:cSld>
@@ -3067,7 +3091,8 @@
           <a:p>
             <a:fld id="{78C97017-6FC3-485B-9764-EAC9E56C1D49}" type="datetimeFigureOut">
               <a:rPr lang="en-US" smtClean="0"/>
-              <a:t>1/7/2017</a:t>
+              <a:pPr/>
+              <a:t>3/23/2017</a:t>
             </a:fld>
             <a:endParaRPr lang="en-US"/>
           </a:p>
@@ -3145,6 +3170,7 @@
           <a:p>
             <a:fld id="{FB34683C-161B-4520-BF45-B179E228CF2A}" type="slidenum">
               <a:rPr lang="en-US" smtClean="0"/>
+              <a:pPr/>
               <a:t>‹#›</a:t>
             </a:fld>
             <a:endParaRPr lang="en-US"/>
@@ -3154,7 +3180,7 @@
     </p:spTree>
     <p:extLst>
       <p:ext uri="{BB962C8B-B14F-4D97-AF65-F5344CB8AC3E}">
-        <p14:creationId xmlns:p14="http://schemas.microsoft.com/office/powerpoint/2010/main" val="2341400630"/>
+        <p14:creationId xmlns:p14="http://schemas.microsoft.com/office/powerpoint/2010/main" xmlns="" val="2341400630"/>
       </p:ext>
     </p:extLst>
   </p:cSld>
@@ -4038,14 +4064,14 @@
           <a:p>
             <a:pPr algn="ctr"/>
             <a:r>
-              <a:rPr lang="en-US" sz="1050" b="1" dirty="0" err="1">
+              <a:rPr lang="en-US" sz="1050" b="1" dirty="0" err="1" smtClean="0">
                 <a:solidFill>
                   <a:schemeClr val="accent3">
                     <a:lumMod val="75000"/>
                   </a:schemeClr>
                 </a:solidFill>
               </a:rPr>
-              <a:t>PersonListPanel</a:t>
+              <a:t>TaskListPanel</a:t>
             </a:r>
             <a:endParaRPr lang="en-SG" sz="1050" b="1" dirty="0">
               <a:solidFill>
@@ -4098,14 +4124,24 @@
           <a:p>
             <a:pPr algn="ctr"/>
             <a:r>
-              <a:rPr lang="en-US" sz="1050" b="1" dirty="0" err="1">
+              <a:rPr lang="en-US" sz="1050" b="1" dirty="0" err="1" smtClean="0">
                 <a:solidFill>
                   <a:schemeClr val="accent3">
                     <a:lumMod val="75000"/>
                   </a:schemeClr>
                 </a:solidFill>
               </a:rPr>
-              <a:t>PersonCard</a:t>
+              <a:t>Task</a:t>
+            </a:r>
+            <a:r>
+              <a:rPr lang="en-US" sz="1050" b="1" dirty="0" err="1" smtClean="0">
+                <a:solidFill>
+                  <a:schemeClr val="accent3">
+                    <a:lumMod val="75000"/>
+                  </a:schemeClr>
+                </a:solidFill>
+              </a:rPr>
+              <a:t>Card</a:t>
             </a:r>
             <a:endParaRPr lang="en-SG" sz="1050" b="1" dirty="0">
               <a:solidFill>
@@ -5512,7 +5548,7 @@
     </p:spTree>
     <p:extLst>
       <p:ext uri="{BB962C8B-B14F-4D97-AF65-F5344CB8AC3E}">
-        <p14:creationId xmlns:p14="http://schemas.microsoft.com/office/powerpoint/2010/main" val="2776882492"/>
+        <p14:creationId xmlns:p14="http://schemas.microsoft.com/office/powerpoint/2010/main" xmlns="" val="2776882492"/>
       </p:ext>
     </p:extLst>
   </p:cSld>

</xml_diff>

<commit_message>
Fix scrolling for labellist on leftpanel Update UIComponentDiagram to add LeftPanel and LeftCard, Removing BrowserPanel for now
</commit_message>
<xml_diff>
--- a/docs/diagrams/UiComponentClassDiagram.pptx
+++ b/docs/diagrams/UiComponentClassDiagram.pptx
@@ -3450,8 +3450,8 @@
         </p:nvSpPr>
         <p:spPr>
           <a:xfrm>
-            <a:off x="1217465" y="1447800"/>
-            <a:ext cx="4917083" cy="3962400"/>
+            <a:off x="1828800" y="990600"/>
+            <a:ext cx="4917083" cy="4876800"/>
           </a:xfrm>
           <a:prstGeom prst="roundRect">
             <a:avLst>
@@ -3512,7 +3512,7 @@
         </p:nvSpPr>
         <p:spPr>
           <a:xfrm>
-            <a:off x="2095948" y="2341220"/>
+            <a:off x="2707283" y="1884020"/>
             <a:ext cx="1093635" cy="346760"/>
           </a:xfrm>
           <a:prstGeom prst="rect">
@@ -3572,7 +3572,7 @@
         </p:nvSpPr>
         <p:spPr>
           <a:xfrm>
-            <a:off x="2592528" y="2971800"/>
+            <a:off x="3203863" y="2514600"/>
             <a:ext cx="1093635" cy="236841"/>
           </a:xfrm>
           <a:prstGeom prst="rect">
@@ -3632,7 +3632,7 @@
         </p:nvSpPr>
         <p:spPr>
           <a:xfrm>
-            <a:off x="2092842" y="1770924"/>
+            <a:off x="2704177" y="1313724"/>
             <a:ext cx="1093635" cy="346760"/>
           </a:xfrm>
           <a:prstGeom prst="rect">
@@ -3694,7 +3694,7 @@
         </p:nvCxnSpPr>
         <p:spPr>
           <a:xfrm rot="16200000" flipH="1">
-            <a:off x="2529445" y="2227899"/>
+            <a:off x="3140780" y="1770699"/>
             <a:ext cx="223536" cy="3106"/>
           </a:xfrm>
           <a:prstGeom prst="bentConnector3">
@@ -3734,7 +3734,7 @@
         </p:nvSpPr>
         <p:spPr>
           <a:xfrm rot="10800000" flipV="1">
-            <a:off x="5394717" y="2110477"/>
+            <a:off x="6006052" y="1653277"/>
             <a:ext cx="270504" cy="175523"/>
           </a:xfrm>
           <a:prstGeom prst="triangle">
@@ -3782,7 +3782,7 @@
         </p:nvCxnSpPr>
         <p:spPr>
           <a:xfrm flipV="1">
-            <a:off x="644735" y="2991937"/>
+            <a:off x="1256070" y="2534737"/>
             <a:ext cx="684904" cy="1"/>
           </a:xfrm>
           <a:prstGeom prst="bentConnector3">
@@ -3825,7 +3825,7 @@
         </p:nvSpPr>
         <p:spPr>
           <a:xfrm rot="16200000">
-            <a:off x="5703829" y="2464877"/>
+            <a:off x="6315164" y="2007677"/>
             <a:ext cx="2362201" cy="328045"/>
           </a:xfrm>
           <a:prstGeom prst="roundRect">
@@ -3879,13 +3879,13 @@
       </p:sp>
       <p:sp>
         <p:nvSpPr>
-          <p:cNvPr id="34" name="Rectangle 11"/>
+          <p:cNvPr id="35" name="Rectangle 11"/>
           <p:cNvSpPr/>
           <p:nvPr/>
         </p:nvSpPr>
         <p:spPr>
           <a:xfrm>
-            <a:off x="2592528" y="3649359"/>
+            <a:off x="3203547" y="3192159"/>
             <a:ext cx="1093635" cy="236841"/>
           </a:xfrm>
           <a:prstGeom prst="rect">
@@ -3925,7 +3925,7 @@
                   </a:schemeClr>
                 </a:solidFill>
               </a:rPr>
-              <a:t>BrowserPanel</a:t>
+              <a:t>StatusBarFooter</a:t>
             </a:r>
             <a:endParaRPr lang="en-SG" sz="1050" b="1" dirty="0">
               <a:solidFill>
@@ -3939,13 +3939,13 @@
       </p:sp>
       <p:sp>
         <p:nvSpPr>
-          <p:cNvPr id="35" name="Rectangle 11"/>
+          <p:cNvPr id="36" name="Rectangle 11"/>
           <p:cNvSpPr/>
           <p:nvPr/>
         </p:nvSpPr>
         <p:spPr>
           <a:xfrm>
-            <a:off x="2592527" y="4563759"/>
+            <a:off x="3203861" y="3534760"/>
             <a:ext cx="1093635" cy="236841"/>
           </a:xfrm>
           <a:prstGeom prst="rect">
@@ -3978,14 +3978,14 @@
           <a:p>
             <a:pPr algn="ctr"/>
             <a:r>
-              <a:rPr lang="en-US" sz="1050" b="1" dirty="0" err="1">
+              <a:rPr lang="en-US" sz="1050" b="1" dirty="0" err="1" smtClean="0">
                 <a:solidFill>
                   <a:schemeClr val="accent3">
                     <a:lumMod val="75000"/>
                   </a:schemeClr>
                 </a:solidFill>
               </a:rPr>
-              <a:t>StatusBarFooter</a:t>
+              <a:t>TaskListPanel</a:t>
             </a:r>
             <a:endParaRPr lang="en-SG" sz="1050" b="1" dirty="0">
               <a:solidFill>
@@ -3999,14 +3999,14 @@
       </p:sp>
       <p:sp>
         <p:nvSpPr>
-          <p:cNvPr id="36" name="Rectangle 11"/>
+          <p:cNvPr id="37" name="Rectangle 11"/>
           <p:cNvSpPr/>
           <p:nvPr/>
         </p:nvSpPr>
         <p:spPr>
           <a:xfrm>
-            <a:off x="2592526" y="3991960"/>
-            <a:ext cx="1093635" cy="236841"/>
+            <a:off x="4450658" y="3771601"/>
+            <a:ext cx="1040906" cy="236841"/>
           </a:xfrm>
           <a:prstGeom prst="rect">
             <a:avLst/>
@@ -4045,17 +4045,7 @@
                   </a:schemeClr>
                 </a:solidFill>
               </a:rPr>
-              <a:t>Task</a:t>
-            </a:r>
-            <a:r>
-              <a:rPr lang="en-US" sz="1050" b="1" dirty="0" err="1" smtClean="0">
-                <a:solidFill>
-                  <a:schemeClr val="accent3">
-                    <a:lumMod val="75000"/>
-                  </a:schemeClr>
-                </a:solidFill>
-              </a:rPr>
-              <a:t>ListPanel</a:t>
+              <a:t>TaskCard</a:t>
             </a:r>
             <a:endParaRPr lang="en-SG" sz="1050" b="1" dirty="0">
               <a:solidFill>
@@ -4069,14 +4059,14 @@
       </p:sp>
       <p:sp>
         <p:nvSpPr>
-          <p:cNvPr id="37" name="Rectangle 11"/>
+          <p:cNvPr id="38" name="Rectangle 11"/>
           <p:cNvSpPr/>
           <p:nvPr/>
         </p:nvSpPr>
         <p:spPr>
           <a:xfrm>
-            <a:off x="3839323" y="4228801"/>
-            <a:ext cx="1040906" cy="236841"/>
+            <a:off x="3119039" y="4856272"/>
+            <a:ext cx="1093635" cy="236841"/>
           </a:xfrm>
           <a:prstGeom prst="rect">
             <a:avLst/>
@@ -4108,76 +4098,6 @@
           <a:p>
             <a:pPr algn="ctr"/>
             <a:r>
-              <a:rPr lang="en-US" sz="1050" b="1" dirty="0" err="1" smtClean="0">
-                <a:solidFill>
-                  <a:schemeClr val="accent3">
-                    <a:lumMod val="75000"/>
-                  </a:schemeClr>
-                </a:solidFill>
-              </a:rPr>
-              <a:t>Task</a:t>
-            </a:r>
-            <a:r>
-              <a:rPr lang="en-US" sz="1050" b="1" dirty="0" err="1" smtClean="0">
-                <a:solidFill>
-                  <a:schemeClr val="accent3">
-                    <a:lumMod val="75000"/>
-                  </a:schemeClr>
-                </a:solidFill>
-              </a:rPr>
-              <a:t>Card</a:t>
-            </a:r>
-            <a:endParaRPr lang="en-SG" sz="1050" b="1" dirty="0">
-              <a:solidFill>
-                <a:schemeClr val="accent3">
-                  <a:lumMod val="75000"/>
-                </a:schemeClr>
-              </a:solidFill>
-            </a:endParaRPr>
-          </a:p>
-        </p:txBody>
-      </p:sp>
-      <p:sp>
-        <p:nvSpPr>
-          <p:cNvPr id="38" name="Rectangle 11"/>
-          <p:cNvSpPr/>
-          <p:nvPr/>
-        </p:nvSpPr>
-        <p:spPr>
-          <a:xfrm>
-            <a:off x="2592528" y="4966000"/>
-            <a:ext cx="1093635" cy="236841"/>
-          </a:xfrm>
-          <a:prstGeom prst="rect">
-            <a:avLst/>
-          </a:prstGeom>
-          <a:ln w="19050">
-            <a:solidFill>
-              <a:schemeClr val="accent3"/>
-            </a:solidFill>
-          </a:ln>
-          <a:effectLst/>
-        </p:spPr>
-        <p:style>
-          <a:lnRef idx="1">
-            <a:schemeClr val="accent3"/>
-          </a:lnRef>
-          <a:fillRef idx="2">
-            <a:schemeClr val="accent3"/>
-          </a:fillRef>
-          <a:effectRef idx="1">
-            <a:schemeClr val="accent3"/>
-          </a:effectRef>
-          <a:fontRef idx="minor">
-            <a:schemeClr val="dk1"/>
-          </a:fontRef>
-        </p:style>
-        <p:txBody>
-          <a:bodyPr rtlCol="0" anchor="ctr"/>
-          <a:lstStyle/>
-          <a:p>
-            <a:pPr algn="ctr"/>
-            <a:r>
               <a:rPr lang="en-US" sz="1050" b="1" dirty="0" err="1">
                 <a:solidFill>
                   <a:schemeClr val="accent3">
@@ -4205,7 +4125,7 @@
         </p:nvSpPr>
         <p:spPr>
           <a:xfrm>
-            <a:off x="2324548" y="2706452"/>
+            <a:off x="2935883" y="2249252"/>
             <a:ext cx="183156" cy="161573"/>
           </a:xfrm>
           <a:prstGeom prst="flowChartDecision">
@@ -4256,7 +4176,7 @@
         </p:nvCxnSpPr>
         <p:spPr>
           <a:xfrm rot="16200000" flipH="1">
-            <a:off x="2393229" y="2890922"/>
+            <a:off x="3004564" y="2433722"/>
             <a:ext cx="222196" cy="176402"/>
           </a:xfrm>
           <a:prstGeom prst="bentConnector2">
@@ -4294,7 +4214,7 @@
         </p:nvSpPr>
         <p:spPr>
           <a:xfrm>
-            <a:off x="2590799" y="3304308"/>
+            <a:off x="3202134" y="2847108"/>
             <a:ext cx="1095361" cy="236841"/>
           </a:xfrm>
           <a:prstGeom prst="rect">
@@ -4351,13 +4271,12 @@
           <p:cNvPr id="44" name="Elbow Connector 63"/>
           <p:cNvCxnSpPr>
             <a:stCxn id="39" idx="2"/>
-            <a:endCxn id="34" idx="1"/>
           </p:cNvCxnSpPr>
           <p:nvPr/>
         </p:nvCxnSpPr>
         <p:spPr>
           <a:xfrm rot="16200000" flipH="1">
-            <a:off x="2054450" y="3229701"/>
+            <a:off x="2665785" y="2772501"/>
             <a:ext cx="899755" cy="176402"/>
           </a:xfrm>
           <a:prstGeom prst="bentConnector2">
@@ -4398,49 +4317,8 @@
         </p:nvCxnSpPr>
         <p:spPr>
           <a:xfrm rot="16200000" flipH="1">
-            <a:off x="1883148" y="3401003"/>
+            <a:off x="2494483" y="2943803"/>
             <a:ext cx="1242356" cy="176400"/>
-          </a:xfrm>
-          <a:prstGeom prst="bentConnector2">
-            <a:avLst/>
-          </a:prstGeom>
-          <a:ln w="19050">
-            <a:solidFill>
-              <a:schemeClr val="accent3"/>
-            </a:solidFill>
-            <a:headEnd type="none" w="med" len="med"/>
-            <a:tailEnd type="arrow" w="med" len="med"/>
-          </a:ln>
-          <a:effectLst/>
-        </p:spPr>
-        <p:style>
-          <a:lnRef idx="1">
-            <a:schemeClr val="accent2"/>
-          </a:lnRef>
-          <a:fillRef idx="2">
-            <a:schemeClr val="accent2"/>
-          </a:fillRef>
-          <a:effectRef idx="1">
-            <a:schemeClr val="accent2"/>
-          </a:effectRef>
-          <a:fontRef idx="minor">
-            <a:schemeClr val="dk1"/>
-          </a:fontRef>
-        </p:style>
-      </p:cxnSp>
-      <p:cxnSp>
-        <p:nvCxnSpPr>
-          <p:cNvPr id="50" name="Elbow Connector 63"/>
-          <p:cNvCxnSpPr>
-            <a:stCxn id="39" idx="2"/>
-            <a:endCxn id="35" idx="1"/>
-          </p:cNvCxnSpPr>
-          <p:nvPr/>
-        </p:nvCxnSpPr>
-        <p:spPr>
-          <a:xfrm rot="16200000" flipH="1">
-            <a:off x="1597249" y="3686901"/>
-            <a:ext cx="1814155" cy="176401"/>
           </a:xfrm>
           <a:prstGeom prst="bentConnector2">
             <a:avLst/>
@@ -4479,8 +4357,8 @@
         </p:nvCxnSpPr>
         <p:spPr>
           <a:xfrm rot="16200000" flipH="1">
-            <a:off x="1184119" y="3676012"/>
-            <a:ext cx="2396440" cy="420377"/>
+            <a:off x="1576956" y="3432609"/>
+            <a:ext cx="2743911" cy="340256"/>
           </a:xfrm>
           <a:prstGeom prst="bentConnector2">
             <a:avLst/>
@@ -4517,7 +4395,7 @@
         </p:nvSpPr>
         <p:spPr>
           <a:xfrm>
-            <a:off x="5143948" y="1770924"/>
+            <a:off x="5755283" y="1313724"/>
             <a:ext cx="772043" cy="346760"/>
           </a:xfrm>
           <a:prstGeom prst="rect">
@@ -4599,7 +4477,7 @@
         </p:nvCxnSpPr>
         <p:spPr>
           <a:xfrm flipV="1">
-            <a:off x="3686160" y="2286000"/>
+            <a:off x="4297495" y="1828800"/>
             <a:ext cx="1843809" cy="1136729"/>
           </a:xfrm>
           <a:prstGeom prst="bentConnector2">
@@ -4640,49 +4518,8 @@
         </p:nvCxnSpPr>
         <p:spPr>
           <a:xfrm rot="5400000">
-            <a:off x="4174488" y="2991741"/>
+            <a:off x="4785823" y="2534541"/>
             <a:ext cx="2061222" cy="649740"/>
-          </a:xfrm>
-          <a:prstGeom prst="bentConnector2">
-            <a:avLst/>
-          </a:prstGeom>
-          <a:ln w="6350">
-            <a:solidFill>
-              <a:schemeClr val="accent3"/>
-            </a:solidFill>
-            <a:headEnd type="none" w="med" len="med"/>
-            <a:tailEnd type="none" w="med" len="med"/>
-          </a:ln>
-          <a:effectLst/>
-        </p:spPr>
-        <p:style>
-          <a:lnRef idx="1">
-            <a:schemeClr val="accent2"/>
-          </a:lnRef>
-          <a:fillRef idx="2">
-            <a:schemeClr val="accent2"/>
-          </a:fillRef>
-          <a:effectRef idx="1">
-            <a:schemeClr val="accent2"/>
-          </a:effectRef>
-          <a:fontRef idx="minor">
-            <a:schemeClr val="dk1"/>
-          </a:fontRef>
-        </p:style>
-      </p:cxnSp>
-      <p:cxnSp>
-        <p:nvCxnSpPr>
-          <p:cNvPr id="82" name="Elbow Connector 63"/>
-          <p:cNvCxnSpPr>
-            <a:stCxn id="16" idx="3"/>
-            <a:endCxn id="34" idx="3"/>
-          </p:cNvCxnSpPr>
-          <p:nvPr/>
-        </p:nvCxnSpPr>
-        <p:spPr>
-          <a:xfrm rot="5400000">
-            <a:off x="3867176" y="2104987"/>
-            <a:ext cx="1481780" cy="1843806"/>
           </a:xfrm>
           <a:prstGeom prst="bentConnector2">
             <a:avLst/>
@@ -4722,7 +4559,7 @@
         </p:nvCxnSpPr>
         <p:spPr>
           <a:xfrm flipV="1">
-            <a:off x="3189583" y="2286000"/>
+            <a:off x="3800918" y="1828800"/>
             <a:ext cx="2340386" cy="228600"/>
           </a:xfrm>
           <a:prstGeom prst="bentConnector2">
@@ -4763,8 +4600,8 @@
         </p:nvCxnSpPr>
         <p:spPr>
           <a:xfrm rot="5400000">
-            <a:off x="3409976" y="2562187"/>
-            <a:ext cx="2396180" cy="1843807"/>
+            <a:off x="4478353" y="1647629"/>
+            <a:ext cx="1481780" cy="1844122"/>
           </a:xfrm>
           <a:prstGeom prst="bentConnector2">
             <a:avLst/>
@@ -4804,8 +4641,8 @@
         </p:nvCxnSpPr>
         <p:spPr>
           <a:xfrm rot="5400000">
-            <a:off x="3208856" y="2763307"/>
-            <a:ext cx="2798421" cy="1843806"/>
+            <a:off x="3604043" y="2437431"/>
+            <a:ext cx="3145893" cy="1928630"/>
           </a:xfrm>
           <a:prstGeom prst="bentConnector2">
             <a:avLst/>
@@ -4844,7 +4681,7 @@
         </p:nvCxnSpPr>
         <p:spPr>
           <a:xfrm rot="5400000" flipH="1" flipV="1">
-            <a:off x="4594921" y="-355061"/>
+            <a:off x="5206256" y="-812261"/>
             <a:ext cx="170724" cy="4081246"/>
           </a:xfrm>
           <a:prstGeom prst="bentConnector2">
@@ -4883,7 +4720,7 @@
         </p:nvSpPr>
         <p:spPr>
           <a:xfrm rot="16200000">
-            <a:off x="6213739" y="4560376"/>
+            <a:off x="6825074" y="4103176"/>
             <a:ext cx="1371599" cy="328045"/>
           </a:xfrm>
           <a:prstGeom prst="roundRect">
@@ -4943,7 +4780,7 @@
         </p:nvSpPr>
         <p:spPr>
           <a:xfrm rot="16200000">
-            <a:off x="956202" y="2861202"/>
+            <a:off x="1567537" y="2404002"/>
             <a:ext cx="1093635" cy="346760"/>
           </a:xfrm>
           <a:prstGeom prst="rect">
@@ -5013,7 +4850,7 @@
         </p:nvSpPr>
         <p:spPr>
           <a:xfrm flipV="1">
-            <a:off x="1367767" y="2286001"/>
+            <a:off x="1979102" y="1828801"/>
             <a:ext cx="270504" cy="175523"/>
           </a:xfrm>
           <a:prstGeom prst="triangle">
@@ -5064,7 +4901,7 @@
         </p:nvCxnSpPr>
         <p:spPr>
           <a:xfrm rot="10800000" flipV="1">
-            <a:off x="1503020" y="1944303"/>
+            <a:off x="2114355" y="1487103"/>
             <a:ext cx="589823" cy="341697"/>
           </a:xfrm>
           <a:prstGeom prst="bentConnector2">
@@ -5106,7 +4943,7 @@
         </p:nvCxnSpPr>
         <p:spPr>
           <a:xfrm rot="16200000" flipH="1">
-            <a:off x="2226110" y="3058040"/>
+            <a:off x="2837445" y="2600840"/>
             <a:ext cx="554704" cy="174673"/>
           </a:xfrm>
           <a:prstGeom prst="bentConnector2">
@@ -5147,7 +4984,7 @@
         </p:nvCxnSpPr>
         <p:spPr>
           <a:xfrm rot="5400000">
-            <a:off x="4205956" y="1766207"/>
+            <a:off x="4817291" y="1309007"/>
             <a:ext cx="804221" cy="1843806"/>
           </a:xfrm>
           <a:prstGeom prst="bentConnector2">
@@ -5188,7 +5025,7 @@
         </p:nvCxnSpPr>
         <p:spPr>
           <a:xfrm rot="16200000" flipH="1">
-            <a:off x="3430123" y="3938021"/>
+            <a:off x="4041458" y="3480821"/>
             <a:ext cx="118421" cy="699979"/>
           </a:xfrm>
           <a:prstGeom prst="bentConnector2">
@@ -5229,7 +5066,7 @@
         </p:nvCxnSpPr>
         <p:spPr>
           <a:xfrm rot="5400000">
-            <a:off x="3695875" y="2276286"/>
+            <a:off x="4307210" y="1819086"/>
             <a:ext cx="1824381" cy="1843808"/>
           </a:xfrm>
           <a:prstGeom prst="bentConnector2">
@@ -5267,7 +5104,7 @@
         </p:nvSpPr>
         <p:spPr>
           <a:xfrm>
-            <a:off x="5435896" y="2743200"/>
+            <a:off x="6047231" y="2286000"/>
             <a:ext cx="229325" cy="166560"/>
           </a:xfrm>
           <a:prstGeom prst="rect">
@@ -5320,7 +5157,7 @@
         </p:nvSpPr>
         <p:spPr>
           <a:xfrm>
-            <a:off x="3687515" y="2828802"/>
+            <a:off x="4298850" y="2371602"/>
             <a:ext cx="3048000" cy="203200"/>
           </a:xfrm>
           <a:custGeom>
@@ -5402,7 +5239,7 @@
         </p:nvSpPr>
         <p:spPr>
           <a:xfrm>
-            <a:off x="5431573" y="4488138"/>
+            <a:off x="6042908" y="4030938"/>
             <a:ext cx="229325" cy="160062"/>
           </a:xfrm>
           <a:prstGeom prst="rect">
@@ -5455,7 +5292,327 @@
         </p:nvSpPr>
         <p:spPr>
           <a:xfrm flipV="1">
-            <a:off x="4114799" y="4472708"/>
+            <a:off x="4726134" y="4015508"/>
+            <a:ext cx="2642195" cy="101600"/>
+          </a:xfrm>
+          <a:custGeom>
+            <a:avLst/>
+            <a:gdLst>
+              <a:gd name="connsiteX0" fmla="*/ 0 w 3048000"/>
+              <a:gd name="connsiteY0" fmla="*/ 203200 h 203200"/>
+              <a:gd name="connsiteX1" fmla="*/ 221673 w 3048000"/>
+              <a:gd name="connsiteY1" fmla="*/ 0 h 203200"/>
+              <a:gd name="connsiteX2" fmla="*/ 3048000 w 3048000"/>
+              <a:gd name="connsiteY2" fmla="*/ 0 h 203200"/>
+            </a:gdLst>
+            <a:ahLst/>
+            <a:cxnLst>
+              <a:cxn ang="0">
+                <a:pos x="connsiteX0" y="connsiteY0"/>
+              </a:cxn>
+              <a:cxn ang="0">
+                <a:pos x="connsiteX1" y="connsiteY1"/>
+              </a:cxn>
+              <a:cxn ang="0">
+                <a:pos x="connsiteX2" y="connsiteY2"/>
+              </a:cxn>
+            </a:cxnLst>
+            <a:rect l="l" t="t" r="r" b="b"/>
+            <a:pathLst>
+              <a:path w="3048000" h="203200">
+                <a:moveTo>
+                  <a:pt x="0" y="203200"/>
+                </a:moveTo>
+                <a:lnTo>
+                  <a:pt x="221673" y="0"/>
+                </a:lnTo>
+                <a:lnTo>
+                  <a:pt x="3048000" y="0"/>
+                </a:lnTo>
+              </a:path>
+            </a:pathLst>
+          </a:custGeom>
+          <a:noFill/>
+          <a:ln w="19050">
+            <a:solidFill>
+              <a:schemeClr val="accent3"/>
+            </a:solidFill>
+            <a:prstDash val="sysDot"/>
+            <a:headEnd type="none" w="med" len="med"/>
+            <a:tailEnd type="arrow" w="med" len="med"/>
+          </a:ln>
+          <a:effectLst/>
+        </p:spPr>
+        <p:style>
+          <a:lnRef idx="1">
+            <a:schemeClr val="accent2"/>
+          </a:lnRef>
+          <a:fillRef idx="2">
+            <a:schemeClr val="accent2"/>
+          </a:fillRef>
+          <a:effectRef idx="1">
+            <a:schemeClr val="accent2"/>
+          </a:effectRef>
+          <a:fontRef idx="minor">
+            <a:schemeClr val="dk1"/>
+          </a:fontRef>
+        </p:style>
+        <p:txBody>
+          <a:bodyPr rtlCol="0" anchor="ctr"/>
+          <a:lstStyle/>
+          <a:p>
+            <a:pPr algn="ctr"/>
+            <a:endParaRPr lang="en-SG"/>
+          </a:p>
+        </p:txBody>
+      </p:sp>
+      <p:sp>
+        <p:nvSpPr>
+          <p:cNvPr id="45" name="Rectangle 11"/>
+          <p:cNvSpPr/>
+          <p:nvPr/>
+        </p:nvSpPr>
+        <p:spPr>
+          <a:xfrm>
+            <a:off x="3204782" y="4095680"/>
+            <a:ext cx="1093635" cy="236841"/>
+          </a:xfrm>
+          <a:prstGeom prst="rect">
+            <a:avLst/>
+          </a:prstGeom>
+          <a:ln w="19050">
+            <a:solidFill>
+              <a:schemeClr val="accent3"/>
+            </a:solidFill>
+          </a:ln>
+          <a:effectLst/>
+        </p:spPr>
+        <p:style>
+          <a:lnRef idx="1">
+            <a:schemeClr val="accent3"/>
+          </a:lnRef>
+          <a:fillRef idx="2">
+            <a:schemeClr val="accent3"/>
+          </a:fillRef>
+          <a:effectRef idx="1">
+            <a:schemeClr val="accent3"/>
+          </a:effectRef>
+          <a:fontRef idx="minor">
+            <a:schemeClr val="dk1"/>
+          </a:fontRef>
+        </p:style>
+        <p:txBody>
+          <a:bodyPr rtlCol="0" anchor="ctr"/>
+          <a:lstStyle/>
+          <a:p>
+            <a:pPr algn="ctr"/>
+            <a:r>
+              <a:rPr lang="en-US" sz="1050" b="1" dirty="0" err="1" smtClean="0">
+                <a:solidFill>
+                  <a:schemeClr val="accent3">
+                    <a:lumMod val="75000"/>
+                  </a:schemeClr>
+                </a:solidFill>
+              </a:rPr>
+              <a:t>LeftPanel</a:t>
+            </a:r>
+            <a:endParaRPr lang="en-SG" sz="1050" b="1" dirty="0">
+              <a:solidFill>
+                <a:schemeClr val="accent3">
+                  <a:lumMod val="75000"/>
+                </a:schemeClr>
+              </a:solidFill>
+            </a:endParaRPr>
+          </a:p>
+        </p:txBody>
+      </p:sp>
+      <p:sp>
+        <p:nvSpPr>
+          <p:cNvPr id="46" name="Rectangle 11"/>
+          <p:cNvSpPr/>
+          <p:nvPr/>
+        </p:nvSpPr>
+        <p:spPr>
+          <a:xfrm>
+            <a:off x="4450658" y="4333298"/>
+            <a:ext cx="1040906" cy="236841"/>
+          </a:xfrm>
+          <a:prstGeom prst="rect">
+            <a:avLst/>
+          </a:prstGeom>
+          <a:ln w="19050">
+            <a:solidFill>
+              <a:schemeClr val="accent3"/>
+            </a:solidFill>
+          </a:ln>
+          <a:effectLst/>
+        </p:spPr>
+        <p:style>
+          <a:lnRef idx="1">
+            <a:schemeClr val="accent3"/>
+          </a:lnRef>
+          <a:fillRef idx="2">
+            <a:schemeClr val="accent3"/>
+          </a:fillRef>
+          <a:effectRef idx="1">
+            <a:schemeClr val="accent3"/>
+          </a:effectRef>
+          <a:fontRef idx="minor">
+            <a:schemeClr val="dk1"/>
+          </a:fontRef>
+        </p:style>
+        <p:txBody>
+          <a:bodyPr rtlCol="0" anchor="ctr"/>
+          <a:lstStyle/>
+          <a:p>
+            <a:pPr algn="ctr"/>
+            <a:r>
+              <a:rPr lang="en-US" sz="1050" b="1" dirty="0" err="1" smtClean="0">
+                <a:solidFill>
+                  <a:schemeClr val="accent3">
+                    <a:lumMod val="75000"/>
+                  </a:schemeClr>
+                </a:solidFill>
+              </a:rPr>
+              <a:t>LabelCard</a:t>
+            </a:r>
+            <a:endParaRPr lang="en-SG" sz="1050" b="1" dirty="0">
+              <a:solidFill>
+                <a:schemeClr val="accent3">
+                  <a:lumMod val="75000"/>
+                </a:schemeClr>
+              </a:solidFill>
+            </a:endParaRPr>
+          </a:p>
+        </p:txBody>
+      </p:sp>
+      <p:cxnSp>
+        <p:nvCxnSpPr>
+          <p:cNvPr id="48" name="Elbow Connector 47"/>
+          <p:cNvCxnSpPr>
+            <a:endCxn id="46" idx="1"/>
+          </p:cNvCxnSpPr>
+          <p:nvPr/>
+        </p:nvCxnSpPr>
+        <p:spPr>
+          <a:xfrm rot="16200000" flipH="1">
+            <a:off x="4041458" y="4042518"/>
+            <a:ext cx="118421" cy="699979"/>
+          </a:xfrm>
+          <a:prstGeom prst="bentConnector2">
+            <a:avLst/>
+          </a:prstGeom>
+          <a:ln w="19050">
+            <a:solidFill>
+              <a:schemeClr val="accent3"/>
+            </a:solidFill>
+            <a:headEnd type="none" w="med" len="med"/>
+            <a:tailEnd type="arrow" w="med" len="med"/>
+          </a:ln>
+          <a:effectLst/>
+        </p:spPr>
+        <p:style>
+          <a:lnRef idx="1">
+            <a:schemeClr val="accent2"/>
+          </a:lnRef>
+          <a:fillRef idx="2">
+            <a:schemeClr val="accent2"/>
+          </a:fillRef>
+          <a:effectRef idx="1">
+            <a:schemeClr val="accent2"/>
+          </a:effectRef>
+          <a:fontRef idx="minor">
+            <a:schemeClr val="dk1"/>
+          </a:fontRef>
+        </p:style>
+      </p:cxnSp>
+      <p:cxnSp>
+        <p:nvCxnSpPr>
+          <p:cNvPr id="49" name="Elbow Connector 63"/>
+          <p:cNvCxnSpPr>
+            <a:endCxn id="45" idx="1"/>
+          </p:cNvCxnSpPr>
+          <p:nvPr/>
+        </p:nvCxnSpPr>
+        <p:spPr>
+          <a:xfrm rot="16200000" flipH="1">
+            <a:off x="2400062" y="3409381"/>
+            <a:ext cx="1430390" cy="179049"/>
+          </a:xfrm>
+          <a:prstGeom prst="bentConnector2">
+            <a:avLst/>
+          </a:prstGeom>
+          <a:ln w="19050">
+            <a:solidFill>
+              <a:schemeClr val="accent3"/>
+            </a:solidFill>
+            <a:headEnd type="none" w="med" len="med"/>
+            <a:tailEnd type="arrow" w="med" len="med"/>
+          </a:ln>
+          <a:effectLst/>
+        </p:spPr>
+        <p:style>
+          <a:lnRef idx="1">
+            <a:schemeClr val="accent2"/>
+          </a:lnRef>
+          <a:fillRef idx="2">
+            <a:schemeClr val="accent2"/>
+          </a:fillRef>
+          <a:effectRef idx="1">
+            <a:schemeClr val="accent2"/>
+          </a:effectRef>
+          <a:fontRef idx="minor">
+            <a:schemeClr val="dk1"/>
+          </a:fontRef>
+        </p:style>
+      </p:cxnSp>
+      <p:cxnSp>
+        <p:nvCxnSpPr>
+          <p:cNvPr id="54" name="Elbow Connector 63"/>
+          <p:cNvCxnSpPr/>
+          <p:nvPr/>
+        </p:nvCxnSpPr>
+        <p:spPr>
+          <a:xfrm rot="5400000">
+            <a:off x="4779764" y="3087013"/>
+            <a:ext cx="2061222" cy="649740"/>
+          </a:xfrm>
+          <a:prstGeom prst="bentConnector2">
+            <a:avLst/>
+          </a:prstGeom>
+          <a:ln w="6350">
+            <a:solidFill>
+              <a:schemeClr val="accent3"/>
+            </a:solidFill>
+            <a:headEnd type="none" w="med" len="med"/>
+            <a:tailEnd type="none" w="med" len="med"/>
+          </a:ln>
+          <a:effectLst/>
+        </p:spPr>
+        <p:style>
+          <a:lnRef idx="1">
+            <a:schemeClr val="accent2"/>
+          </a:lnRef>
+          <a:fillRef idx="2">
+            <a:schemeClr val="accent2"/>
+          </a:fillRef>
+          <a:effectRef idx="1">
+            <a:schemeClr val="accent2"/>
+          </a:effectRef>
+          <a:fontRef idx="minor">
+            <a:schemeClr val="dk1"/>
+          </a:fontRef>
+        </p:style>
+      </p:cxnSp>
+      <p:sp>
+        <p:nvSpPr>
+          <p:cNvPr id="55" name="Freeform 54"/>
+          <p:cNvSpPr/>
+          <p:nvPr/>
+        </p:nvSpPr>
+        <p:spPr>
+          <a:xfrm flipV="1">
+            <a:off x="4726454" y="4572000"/>
             <a:ext cx="2642195" cy="101600"/>
           </a:xfrm>
           <a:custGeom>

</xml_diff>

<commit_message>
udpate ui diagram to include command history
</commit_message>
<xml_diff>
--- a/docs/diagrams/UiComponentClassDiagram.pptx
+++ b/docs/diagrams/UiComponentClassDiagram.pptx
@@ -109,7 +109,7 @@
   </p:defaultTextStyle>
   <p:extLst>
     <p:ext uri="{EFAFB233-063F-42B5-8137-9DF3F51BA10A}">
-      <p15:sldGuideLst xmlns="" xmlns:p15="http://schemas.microsoft.com/office/powerpoint/2012/main">
+      <p15:sldGuideLst xmlns:p15="http://schemas.microsoft.com/office/powerpoint/2012/main">
         <p15:guide id="1" orient="horz" pos="1488">
           <p15:clr>
             <a:srgbClr val="A4A3A4"/>
@@ -208,7 +208,7 @@
           <a:p>
             <a:fld id="{F5CC4B3F-88C1-4FFA-B1B6-F41C21DC6924}" type="datetimeFigureOut">
               <a:rPr lang="en-US" smtClean="0"/>
-              <a:t>3/15/2017</a:t>
+              <a:t>3/24/2017</a:t>
             </a:fld>
             <a:endParaRPr lang="en-US"/>
           </a:p>
@@ -654,7 +654,7 @@
           <a:p>
             <a:fld id="{78C97017-6FC3-485B-9764-EAC9E56C1D49}" type="datetimeFigureOut">
               <a:rPr lang="en-US" smtClean="0"/>
-              <a:t>3/15/2017</a:t>
+              <a:t>3/24/2017</a:t>
             </a:fld>
             <a:endParaRPr lang="en-US"/>
           </a:p>
@@ -822,7 +822,7 @@
           <a:p>
             <a:fld id="{78C97017-6FC3-485B-9764-EAC9E56C1D49}" type="datetimeFigureOut">
               <a:rPr lang="en-US" smtClean="0"/>
-              <a:t>3/15/2017</a:t>
+              <a:t>3/24/2017</a:t>
             </a:fld>
             <a:endParaRPr lang="en-US"/>
           </a:p>
@@ -1000,7 +1000,7 @@
           <a:p>
             <a:fld id="{78C97017-6FC3-485B-9764-EAC9E56C1D49}" type="datetimeFigureOut">
               <a:rPr lang="en-US" smtClean="0"/>
-              <a:t>3/15/2017</a:t>
+              <a:t>3/24/2017</a:t>
             </a:fld>
             <a:endParaRPr lang="en-US"/>
           </a:p>
@@ -1168,7 +1168,7 @@
           <a:p>
             <a:fld id="{78C97017-6FC3-485B-9764-EAC9E56C1D49}" type="datetimeFigureOut">
               <a:rPr lang="en-US" smtClean="0"/>
-              <a:t>3/15/2017</a:t>
+              <a:t>3/24/2017</a:t>
             </a:fld>
             <a:endParaRPr lang="en-US"/>
           </a:p>
@@ -1413,7 +1413,7 @@
           <a:p>
             <a:fld id="{78C97017-6FC3-485B-9764-EAC9E56C1D49}" type="datetimeFigureOut">
               <a:rPr lang="en-US" smtClean="0"/>
-              <a:t>3/15/2017</a:t>
+              <a:t>3/24/2017</a:t>
             </a:fld>
             <a:endParaRPr lang="en-US"/>
           </a:p>
@@ -1698,7 +1698,7 @@
           <a:p>
             <a:fld id="{78C97017-6FC3-485B-9764-EAC9E56C1D49}" type="datetimeFigureOut">
               <a:rPr lang="en-US" smtClean="0"/>
-              <a:t>3/15/2017</a:t>
+              <a:t>3/24/2017</a:t>
             </a:fld>
             <a:endParaRPr lang="en-US"/>
           </a:p>
@@ -2117,7 +2117,7 @@
           <a:p>
             <a:fld id="{78C97017-6FC3-485B-9764-EAC9E56C1D49}" type="datetimeFigureOut">
               <a:rPr lang="en-US" smtClean="0"/>
-              <a:t>3/15/2017</a:t>
+              <a:t>3/24/2017</a:t>
             </a:fld>
             <a:endParaRPr lang="en-US"/>
           </a:p>
@@ -2234,7 +2234,7 @@
           <a:p>
             <a:fld id="{78C97017-6FC3-485B-9764-EAC9E56C1D49}" type="datetimeFigureOut">
               <a:rPr lang="en-US" smtClean="0"/>
-              <a:t>3/15/2017</a:t>
+              <a:t>3/24/2017</a:t>
             </a:fld>
             <a:endParaRPr lang="en-US"/>
           </a:p>
@@ -2329,7 +2329,7 @@
           <a:p>
             <a:fld id="{78C97017-6FC3-485B-9764-EAC9E56C1D49}" type="datetimeFigureOut">
               <a:rPr lang="en-US" smtClean="0"/>
-              <a:t>3/15/2017</a:t>
+              <a:t>3/24/2017</a:t>
             </a:fld>
             <a:endParaRPr lang="en-US"/>
           </a:p>
@@ -2604,7 +2604,7 @@
           <a:p>
             <a:fld id="{78C97017-6FC3-485B-9764-EAC9E56C1D49}" type="datetimeFigureOut">
               <a:rPr lang="en-US" smtClean="0"/>
-              <a:t>3/15/2017</a:t>
+              <a:t>3/24/2017</a:t>
             </a:fld>
             <a:endParaRPr lang="en-US"/>
           </a:p>
@@ -2856,7 +2856,7 @@
           <a:p>
             <a:fld id="{78C97017-6FC3-485B-9764-EAC9E56C1D49}" type="datetimeFigureOut">
               <a:rPr lang="en-US" smtClean="0"/>
-              <a:t>3/15/2017</a:t>
+              <a:t>3/24/2017</a:t>
             </a:fld>
             <a:endParaRPr lang="en-US"/>
           </a:p>
@@ -3067,7 +3067,7 @@
           <a:p>
             <a:fld id="{78C97017-6FC3-485B-9764-EAC9E56C1D49}" type="datetimeFigureOut">
               <a:rPr lang="en-US" smtClean="0"/>
-              <a:t>3/15/2017</a:t>
+              <a:t>3/24/2017</a:t>
             </a:fld>
             <a:endParaRPr lang="en-US"/>
           </a:p>
@@ -3450,8 +3450,8 @@
         </p:nvSpPr>
         <p:spPr>
           <a:xfrm>
-            <a:off x="1217465" y="1447800"/>
-            <a:ext cx="4917083" cy="3962400"/>
+            <a:off x="1217465" y="381000"/>
+            <a:ext cx="4917083" cy="5029200"/>
           </a:xfrm>
           <a:prstGeom prst="roundRect">
             <a:avLst>
@@ -3512,7 +3512,7 @@
         </p:nvSpPr>
         <p:spPr>
           <a:xfrm>
-            <a:off x="2095948" y="2341220"/>
+            <a:off x="2094401" y="1957450"/>
             <a:ext cx="1093635" cy="346760"/>
           </a:xfrm>
           <a:prstGeom prst="rect">
@@ -3632,7 +3632,7 @@
         </p:nvSpPr>
         <p:spPr>
           <a:xfrm>
-            <a:off x="2092842" y="1770924"/>
+            <a:off x="2094402" y="1186401"/>
             <a:ext cx="1093635" cy="346760"/>
           </a:xfrm>
           <a:prstGeom prst="rect">
@@ -3693,9 +3693,9 @@
           <p:nvPr/>
         </p:nvCxnSpPr>
         <p:spPr>
-          <a:xfrm rot="16200000" flipH="1">
-            <a:off x="2529445" y="2227899"/>
-            <a:ext cx="223536" cy="3106"/>
+          <a:xfrm rot="5400000">
+            <a:off x="2429076" y="1745305"/>
+            <a:ext cx="424289" cy="1"/>
           </a:xfrm>
           <a:prstGeom prst="bentConnector3">
             <a:avLst>
@@ -3734,7 +3734,7 @@
         </p:nvSpPr>
         <p:spPr>
           <a:xfrm rot="10800000" flipV="1">
-            <a:off x="5394717" y="2110477"/>
+            <a:off x="5407063" y="1839533"/>
             <a:ext cx="270504" cy="175523"/>
           </a:xfrm>
           <a:prstGeom prst="triangle">
@@ -3825,8 +3825,8 @@
         </p:nvSpPr>
         <p:spPr>
           <a:xfrm rot="16200000">
-            <a:off x="5703829" y="2464877"/>
-            <a:ext cx="2362201" cy="328045"/>
+            <a:off x="5640177" y="1783197"/>
+            <a:ext cx="2522841" cy="328045"/>
           </a:xfrm>
           <a:prstGeom prst="roundRect">
             <a:avLst/>
@@ -4125,8 +4125,8 @@
         </p:nvSpPr>
         <p:spPr>
           <a:xfrm>
-            <a:off x="2324548" y="2706452"/>
-            <a:ext cx="183156" cy="161573"/>
+            <a:off x="2291333" y="2319798"/>
+            <a:ext cx="183156" cy="201025"/>
           </a:xfrm>
           <a:prstGeom prst="flowChartDecision">
             <a:avLst/>
@@ -4176,8 +4176,8 @@
         </p:nvCxnSpPr>
         <p:spPr>
           <a:xfrm rot="16200000" flipH="1">
-            <a:off x="2393229" y="2890922"/>
-            <a:ext cx="222196" cy="176402"/>
+            <a:off x="2203020" y="2700713"/>
+            <a:ext cx="569398" cy="209617"/>
           </a:xfrm>
           <a:prstGeom prst="bentConnector2">
             <a:avLst/>
@@ -4277,8 +4277,8 @@
         </p:nvCxnSpPr>
         <p:spPr>
           <a:xfrm rot="16200000" flipH="1">
-            <a:off x="2005077" y="3279074"/>
-            <a:ext cx="998499" cy="176400"/>
+            <a:off x="1814868" y="3088865"/>
+            <a:ext cx="1345701" cy="209615"/>
           </a:xfrm>
           <a:prstGeom prst="bentConnector2">
             <a:avLst/>
@@ -4318,8 +4318,8 @@
         </p:nvCxnSpPr>
         <p:spPr>
           <a:xfrm rot="16200000" flipH="1">
-            <a:off x="1597249" y="3686901"/>
-            <a:ext cx="1814155" cy="176401"/>
+            <a:off x="1407041" y="3496693"/>
+            <a:ext cx="2161357" cy="209616"/>
           </a:xfrm>
           <a:prstGeom prst="bentConnector2">
             <a:avLst/>
@@ -4358,8 +4358,8 @@
         </p:nvCxnSpPr>
         <p:spPr>
           <a:xfrm rot="16200000" flipH="1">
-            <a:off x="1184119" y="3676012"/>
-            <a:ext cx="2396440" cy="420377"/>
+            <a:off x="998050" y="3489942"/>
+            <a:ext cx="2770957" cy="417999"/>
           </a:xfrm>
           <a:prstGeom prst="bentConnector2">
             <a:avLst/>
@@ -4396,7 +4396,7 @@
         </p:nvSpPr>
         <p:spPr>
           <a:xfrm>
-            <a:off x="5143948" y="1770924"/>
+            <a:off x="5143947" y="1424677"/>
             <a:ext cx="772043" cy="346760"/>
           </a:xfrm>
           <a:prstGeom prst="rect">
@@ -4478,8 +4478,8 @@
         </p:nvCxnSpPr>
         <p:spPr>
           <a:xfrm flipV="1">
-            <a:off x="3686160" y="2286000"/>
-            <a:ext cx="1843809" cy="1136729"/>
+            <a:off x="3686160" y="2015056"/>
+            <a:ext cx="1856155" cy="1407673"/>
           </a:xfrm>
           <a:prstGeom prst="bentConnector2">
             <a:avLst/>
@@ -4519,8 +4519,8 @@
         </p:nvCxnSpPr>
         <p:spPr>
           <a:xfrm rot="5400000">
-            <a:off x="4233698" y="2932531"/>
-            <a:ext cx="1942802" cy="649740"/>
+            <a:off x="4104399" y="2790886"/>
+            <a:ext cx="2213746" cy="662086"/>
           </a:xfrm>
           <a:prstGeom prst="bentConnector2">
             <a:avLst/>
@@ -4560,8 +4560,8 @@
         </p:nvCxnSpPr>
         <p:spPr>
           <a:xfrm flipV="1">
-            <a:off x="3189583" y="2286000"/>
-            <a:ext cx="2340386" cy="228600"/>
+            <a:off x="3188036" y="2015056"/>
+            <a:ext cx="2354279" cy="115774"/>
           </a:xfrm>
           <a:prstGeom prst="bentConnector2">
             <a:avLst/>
@@ -4601,8 +4601,8 @@
         </p:nvCxnSpPr>
         <p:spPr>
           <a:xfrm rot="5400000">
-            <a:off x="3409976" y="2562187"/>
-            <a:ext cx="2396180" cy="1843807"/>
+            <a:off x="3280677" y="2420542"/>
+            <a:ext cx="2667124" cy="1856153"/>
           </a:xfrm>
           <a:prstGeom prst="bentConnector2">
             <a:avLst/>
@@ -4642,8 +4642,8 @@
         </p:nvCxnSpPr>
         <p:spPr>
           <a:xfrm rot="5400000">
-            <a:off x="3208856" y="2763307"/>
-            <a:ext cx="2798421" cy="1843806"/>
+            <a:off x="3079557" y="2621662"/>
+            <a:ext cx="3069365" cy="1856152"/>
           </a:xfrm>
           <a:prstGeom prst="bentConnector2">
             <a:avLst/>
@@ -4682,7 +4682,7 @@
         </p:nvCxnSpPr>
         <p:spPr>
           <a:xfrm rot="5400000" flipH="1" flipV="1">
-            <a:off x="4594921" y="-355061"/>
+            <a:off x="4596481" y="-939584"/>
             <a:ext cx="170724" cy="4081246"/>
           </a:xfrm>
           <a:prstGeom prst="bentConnector2">
@@ -4902,8 +4902,8 @@
         </p:nvCxnSpPr>
         <p:spPr>
           <a:xfrm rot="10800000" flipV="1">
-            <a:off x="1503020" y="1944303"/>
-            <a:ext cx="589823" cy="341697"/>
+            <a:off x="1503020" y="1359781"/>
+            <a:ext cx="591383" cy="926220"/>
           </a:xfrm>
           <a:prstGeom prst="bentConnector2">
             <a:avLst/>
@@ -4944,8 +4944,8 @@
         </p:nvCxnSpPr>
         <p:spPr>
           <a:xfrm rot="16200000" flipH="1">
-            <a:off x="2226110" y="3058040"/>
-            <a:ext cx="554704" cy="174673"/>
+            <a:off x="2035902" y="2867832"/>
+            <a:ext cx="901906" cy="207888"/>
           </a:xfrm>
           <a:prstGeom prst="bentConnector2">
             <a:avLst/>
@@ -4985,8 +4985,8 @@
         </p:nvCxnSpPr>
         <p:spPr>
           <a:xfrm rot="5400000">
-            <a:off x="4205956" y="1766207"/>
-            <a:ext cx="804221" cy="1843806"/>
+            <a:off x="4076657" y="1624562"/>
+            <a:ext cx="1075165" cy="1856152"/>
           </a:xfrm>
           <a:prstGeom prst="bentConnector2">
             <a:avLst/>
@@ -5067,8 +5067,8 @@
         </p:nvCxnSpPr>
         <p:spPr>
           <a:xfrm rot="5400000">
-            <a:off x="3817803" y="2154358"/>
-            <a:ext cx="1580524" cy="1843808"/>
+            <a:off x="3688504" y="2012713"/>
+            <a:ext cx="1851468" cy="1856154"/>
           </a:xfrm>
           <a:prstGeom prst="bentConnector2">
             <a:avLst/>
@@ -5364,6 +5364,107 @@
           <a:p>
             <a:pPr algn="ctr"/>
             <a:endParaRPr lang="en-SG"/>
+          </a:p>
+        </p:txBody>
+      </p:sp>
+      <p:cxnSp>
+        <p:nvCxnSpPr>
+          <p:cNvPr id="66" name="Elbow Connector 63"/>
+          <p:cNvCxnSpPr>
+            <a:stCxn id="3" idx="0"/>
+          </p:cNvCxnSpPr>
+          <p:nvPr/>
+        </p:nvCxnSpPr>
+        <p:spPr>
+          <a:xfrm rot="5400000" flipH="1" flipV="1">
+            <a:off x="3031167" y="2573967"/>
+            <a:ext cx="506013" cy="289654"/>
+          </a:xfrm>
+          <a:prstGeom prst="bentConnector3">
+            <a:avLst>
+              <a:gd name="adj1" fmla="val 99883"/>
+            </a:avLst>
+          </a:prstGeom>
+          <a:ln w="19050">
+            <a:solidFill>
+              <a:srgbClr val="00B050"/>
+            </a:solidFill>
+            <a:headEnd type="none" w="med" len="med"/>
+            <a:tailEnd type="arrow" w="med" len="med"/>
+          </a:ln>
+          <a:effectLst/>
+        </p:spPr>
+        <p:style>
+          <a:lnRef idx="1">
+            <a:schemeClr val="accent2"/>
+          </a:lnRef>
+          <a:fillRef idx="2">
+            <a:schemeClr val="accent2"/>
+          </a:fillRef>
+          <a:effectRef idx="1">
+            <a:schemeClr val="accent2"/>
+          </a:effectRef>
+          <a:fontRef idx="minor">
+            <a:schemeClr val="dk1"/>
+          </a:fontRef>
+        </p:style>
+      </p:cxnSp>
+      <p:sp>
+        <p:nvSpPr>
+          <p:cNvPr id="70" name="Rectangle 62"/>
+          <p:cNvSpPr/>
+          <p:nvPr/>
+        </p:nvSpPr>
+        <p:spPr>
+          <a:xfrm>
+            <a:off x="3500229" y="2245784"/>
+            <a:ext cx="1093635" cy="346760"/>
+          </a:xfrm>
+          <a:prstGeom prst="rect">
+            <a:avLst/>
+          </a:prstGeom>
+          <a:solidFill>
+            <a:srgbClr val="00B050"/>
+          </a:solidFill>
+          <a:ln w="19050">
+            <a:solidFill>
+              <a:srgbClr val="00B050"/>
+            </a:solidFill>
+          </a:ln>
+          <a:effectLst/>
+        </p:spPr>
+        <p:style>
+          <a:lnRef idx="1">
+            <a:schemeClr val="accent2"/>
+          </a:lnRef>
+          <a:fillRef idx="2">
+            <a:schemeClr val="accent2"/>
+          </a:fillRef>
+          <a:effectRef idx="1">
+            <a:schemeClr val="accent2"/>
+          </a:effectRef>
+          <a:fontRef idx="minor">
+            <a:schemeClr val="dk1"/>
+          </a:fontRef>
+        </p:style>
+        <p:txBody>
+          <a:bodyPr rtlCol="0" anchor="ctr"/>
+          <a:lstStyle/>
+          <a:p>
+            <a:pPr algn="ctr"/>
+            <a:r>
+              <a:rPr lang="en-US" sz="1050" smtClean="0">
+                <a:solidFill>
+                  <a:schemeClr val="bg1"/>
+                </a:solidFill>
+              </a:rPr>
+              <a:t>History&lt;String&gt;</a:t>
+            </a:r>
+            <a:endParaRPr lang="en-SG" sz="1050" dirty="0">
+              <a:solidFill>
+                <a:schemeClr val="bg1"/>
+              </a:solidFill>
+            </a:endParaRPr>
           </a:p>
         </p:txBody>
       </p:sp>

</xml_diff>

<commit_message>
Update UI class diagram in Developer Guide
</commit_message>
<xml_diff>
--- a/docs/diagrams/UiComponentClassDiagram.pptx
+++ b/docs/diagrams/UiComponentClassDiagram.pptx
@@ -208,7 +208,7 @@
           <a:p>
             <a:fld id="{F5CC4B3F-88C1-4FFA-B1B6-F41C21DC6924}" type="datetimeFigureOut">
               <a:rPr lang="en-US" smtClean="0"/>
-              <a:t>1/7/2017</a:t>
+              <a:t>3/27/2017</a:t>
             </a:fld>
             <a:endParaRPr lang="en-US"/>
           </a:p>
@@ -654,7 +654,7 @@
           <a:p>
             <a:fld id="{78C97017-6FC3-485B-9764-EAC9E56C1D49}" type="datetimeFigureOut">
               <a:rPr lang="en-US" smtClean="0"/>
-              <a:t>1/7/2017</a:t>
+              <a:t>3/27/2017</a:t>
             </a:fld>
             <a:endParaRPr lang="en-US"/>
           </a:p>
@@ -822,7 +822,7 @@
           <a:p>
             <a:fld id="{78C97017-6FC3-485B-9764-EAC9E56C1D49}" type="datetimeFigureOut">
               <a:rPr lang="en-US" smtClean="0"/>
-              <a:t>1/7/2017</a:t>
+              <a:t>3/27/2017</a:t>
             </a:fld>
             <a:endParaRPr lang="en-US"/>
           </a:p>
@@ -1000,7 +1000,7 @@
           <a:p>
             <a:fld id="{78C97017-6FC3-485B-9764-EAC9E56C1D49}" type="datetimeFigureOut">
               <a:rPr lang="en-US" smtClean="0"/>
-              <a:t>1/7/2017</a:t>
+              <a:t>3/27/2017</a:t>
             </a:fld>
             <a:endParaRPr lang="en-US"/>
           </a:p>
@@ -1168,7 +1168,7 @@
           <a:p>
             <a:fld id="{78C97017-6FC3-485B-9764-EAC9E56C1D49}" type="datetimeFigureOut">
               <a:rPr lang="en-US" smtClean="0"/>
-              <a:t>1/7/2017</a:t>
+              <a:t>3/27/2017</a:t>
             </a:fld>
             <a:endParaRPr lang="en-US"/>
           </a:p>
@@ -1413,7 +1413,7 @@
           <a:p>
             <a:fld id="{78C97017-6FC3-485B-9764-EAC9E56C1D49}" type="datetimeFigureOut">
               <a:rPr lang="en-US" smtClean="0"/>
-              <a:t>1/7/2017</a:t>
+              <a:t>3/27/2017</a:t>
             </a:fld>
             <a:endParaRPr lang="en-US"/>
           </a:p>
@@ -1698,7 +1698,7 @@
           <a:p>
             <a:fld id="{78C97017-6FC3-485B-9764-EAC9E56C1D49}" type="datetimeFigureOut">
               <a:rPr lang="en-US" smtClean="0"/>
-              <a:t>1/7/2017</a:t>
+              <a:t>3/27/2017</a:t>
             </a:fld>
             <a:endParaRPr lang="en-US"/>
           </a:p>
@@ -2117,7 +2117,7 @@
           <a:p>
             <a:fld id="{78C97017-6FC3-485B-9764-EAC9E56C1D49}" type="datetimeFigureOut">
               <a:rPr lang="en-US" smtClean="0"/>
-              <a:t>1/7/2017</a:t>
+              <a:t>3/27/2017</a:t>
             </a:fld>
             <a:endParaRPr lang="en-US"/>
           </a:p>
@@ -2234,7 +2234,7 @@
           <a:p>
             <a:fld id="{78C97017-6FC3-485B-9764-EAC9E56C1D49}" type="datetimeFigureOut">
               <a:rPr lang="en-US" smtClean="0"/>
-              <a:t>1/7/2017</a:t>
+              <a:t>3/27/2017</a:t>
             </a:fld>
             <a:endParaRPr lang="en-US"/>
           </a:p>
@@ -2329,7 +2329,7 @@
           <a:p>
             <a:fld id="{78C97017-6FC3-485B-9764-EAC9E56C1D49}" type="datetimeFigureOut">
               <a:rPr lang="en-US" smtClean="0"/>
-              <a:t>1/7/2017</a:t>
+              <a:t>3/27/2017</a:t>
             </a:fld>
             <a:endParaRPr lang="en-US"/>
           </a:p>
@@ -2604,7 +2604,7 @@
           <a:p>
             <a:fld id="{78C97017-6FC3-485B-9764-EAC9E56C1D49}" type="datetimeFigureOut">
               <a:rPr lang="en-US" smtClean="0"/>
-              <a:t>1/7/2017</a:t>
+              <a:t>3/27/2017</a:t>
             </a:fld>
             <a:endParaRPr lang="en-US"/>
           </a:p>
@@ -2856,7 +2856,7 @@
           <a:p>
             <a:fld id="{78C97017-6FC3-485B-9764-EAC9E56C1D49}" type="datetimeFigureOut">
               <a:rPr lang="en-US" smtClean="0"/>
-              <a:t>1/7/2017</a:t>
+              <a:t>3/27/2017</a:t>
             </a:fld>
             <a:endParaRPr lang="en-US"/>
           </a:p>
@@ -3067,7 +3067,7 @@
           <a:p>
             <a:fld id="{78C97017-6FC3-485B-9764-EAC9E56C1D49}" type="datetimeFigureOut">
               <a:rPr lang="en-US" smtClean="0"/>
-              <a:t>1/7/2017</a:t>
+              <a:t>3/27/2017</a:t>
             </a:fld>
             <a:endParaRPr lang="en-US"/>
           </a:p>
@@ -3925,7 +3925,7 @@
                   </a:schemeClr>
                 </a:solidFill>
               </a:rPr>
-              <a:t>BrowserPanel</a:t>
+              <a:t>TaskCardHeader</a:t>
             </a:r>
             <a:endParaRPr lang="en-SG" sz="1050" b="1" dirty="0">
               <a:solidFill>
@@ -4045,7 +4045,7 @@
                   </a:schemeClr>
                 </a:solidFill>
               </a:rPr>
-              <a:t>PersonListPanel</a:t>
+              <a:t>TaskListPanel</a:t>
             </a:r>
             <a:endParaRPr lang="en-SG" sz="1050" b="1" dirty="0">
               <a:solidFill>
@@ -4105,7 +4105,7 @@
                   </a:schemeClr>
                 </a:solidFill>
               </a:rPr>
-              <a:t>PersonCard</a:t>
+              <a:t>TaskCard</a:t>
             </a:r>
             <a:endParaRPr lang="en-SG" sz="1050" b="1" dirty="0">
               <a:solidFill>

</xml_diff>

<commit_message>
Update developer Guide and UserGuide
</commit_message>
<xml_diff>
--- a/docs/diagrams/UiComponentClassDiagram.pptx
+++ b/docs/diagrams/UiComponentClassDiagram.pptx
@@ -208,7 +208,7 @@
           <a:p>
             <a:fld id="{F5CC4B3F-88C1-4FFA-B1B6-F41C21DC6924}" type="datetimeFigureOut">
               <a:rPr lang="en-US" smtClean="0"/>
-              <a:t>3/9/17</a:t>
+              <a:t>4/6/2017</a:t>
             </a:fld>
             <a:endParaRPr lang="en-US"/>
           </a:p>
@@ -654,7 +654,7 @@
           <a:p>
             <a:fld id="{78C97017-6FC3-485B-9764-EAC9E56C1D49}" type="datetimeFigureOut">
               <a:rPr lang="en-US" smtClean="0"/>
-              <a:t>3/9/17</a:t>
+              <a:t>4/6/2017</a:t>
             </a:fld>
             <a:endParaRPr lang="en-US"/>
           </a:p>
@@ -822,7 +822,7 @@
           <a:p>
             <a:fld id="{78C97017-6FC3-485B-9764-EAC9E56C1D49}" type="datetimeFigureOut">
               <a:rPr lang="en-US" smtClean="0"/>
-              <a:t>3/9/17</a:t>
+              <a:t>4/6/2017</a:t>
             </a:fld>
             <a:endParaRPr lang="en-US"/>
           </a:p>
@@ -1000,7 +1000,7 @@
           <a:p>
             <a:fld id="{78C97017-6FC3-485B-9764-EAC9E56C1D49}" type="datetimeFigureOut">
               <a:rPr lang="en-US" smtClean="0"/>
-              <a:t>3/9/17</a:t>
+              <a:t>4/6/2017</a:t>
             </a:fld>
             <a:endParaRPr lang="en-US"/>
           </a:p>
@@ -1168,7 +1168,7 @@
           <a:p>
             <a:fld id="{78C97017-6FC3-485B-9764-EAC9E56C1D49}" type="datetimeFigureOut">
               <a:rPr lang="en-US" smtClean="0"/>
-              <a:t>3/9/17</a:t>
+              <a:t>4/6/2017</a:t>
             </a:fld>
             <a:endParaRPr lang="en-US"/>
           </a:p>
@@ -1413,7 +1413,7 @@
           <a:p>
             <a:fld id="{78C97017-6FC3-485B-9764-EAC9E56C1D49}" type="datetimeFigureOut">
               <a:rPr lang="en-US" smtClean="0"/>
-              <a:t>3/9/17</a:t>
+              <a:t>4/6/2017</a:t>
             </a:fld>
             <a:endParaRPr lang="en-US"/>
           </a:p>
@@ -1698,7 +1698,7 @@
           <a:p>
             <a:fld id="{78C97017-6FC3-485B-9764-EAC9E56C1D49}" type="datetimeFigureOut">
               <a:rPr lang="en-US" smtClean="0"/>
-              <a:t>3/9/17</a:t>
+              <a:t>4/6/2017</a:t>
             </a:fld>
             <a:endParaRPr lang="en-US"/>
           </a:p>
@@ -2117,7 +2117,7 @@
           <a:p>
             <a:fld id="{78C97017-6FC3-485B-9764-EAC9E56C1D49}" type="datetimeFigureOut">
               <a:rPr lang="en-US" smtClean="0"/>
-              <a:t>3/9/17</a:t>
+              <a:t>4/6/2017</a:t>
             </a:fld>
             <a:endParaRPr lang="en-US"/>
           </a:p>
@@ -2234,7 +2234,7 @@
           <a:p>
             <a:fld id="{78C97017-6FC3-485B-9764-EAC9E56C1D49}" type="datetimeFigureOut">
               <a:rPr lang="en-US" smtClean="0"/>
-              <a:t>3/9/17</a:t>
+              <a:t>4/6/2017</a:t>
             </a:fld>
             <a:endParaRPr lang="en-US"/>
           </a:p>
@@ -2329,7 +2329,7 @@
           <a:p>
             <a:fld id="{78C97017-6FC3-485B-9764-EAC9E56C1D49}" type="datetimeFigureOut">
               <a:rPr lang="en-US" smtClean="0"/>
-              <a:t>3/9/17</a:t>
+              <a:t>4/6/2017</a:t>
             </a:fld>
             <a:endParaRPr lang="en-US"/>
           </a:p>
@@ -2604,7 +2604,7 @@
           <a:p>
             <a:fld id="{78C97017-6FC3-485B-9764-EAC9E56C1D49}" type="datetimeFigureOut">
               <a:rPr lang="en-US" smtClean="0"/>
-              <a:t>3/9/17</a:t>
+              <a:t>4/6/2017</a:t>
             </a:fld>
             <a:endParaRPr lang="en-US"/>
           </a:p>
@@ -2856,7 +2856,7 @@
           <a:p>
             <a:fld id="{78C97017-6FC3-485B-9764-EAC9E56C1D49}" type="datetimeFigureOut">
               <a:rPr lang="en-US" smtClean="0"/>
-              <a:t>3/9/17</a:t>
+              <a:t>4/6/2017</a:t>
             </a:fld>
             <a:endParaRPr lang="en-US"/>
           </a:p>
@@ -3067,7 +3067,7 @@
           <a:p>
             <a:fld id="{78C97017-6FC3-485B-9764-EAC9E56C1D49}" type="datetimeFigureOut">
               <a:rPr lang="en-US" smtClean="0"/>
-              <a:t>3/9/17</a:t>
+              <a:t>4/6/2017</a:t>
             </a:fld>
             <a:endParaRPr lang="en-US"/>
           </a:p>
@@ -3450,8 +3450,8 @@
         </p:nvSpPr>
         <p:spPr>
           <a:xfrm>
-            <a:off x="1217465" y="1447800"/>
-            <a:ext cx="4917083" cy="3962400"/>
+            <a:off x="1329639" y="1449116"/>
+            <a:ext cx="5190004" cy="4267200"/>
           </a:xfrm>
           <a:prstGeom prst="roundRect">
             <a:avLst>
@@ -3492,7 +3492,7 @@
                   </a:schemeClr>
                 </a:solidFill>
               </a:rPr>
-              <a:t>UI</a:t>
+              <a:t>`list`</a:t>
             </a:r>
             <a:endParaRPr lang="en-SG" sz="1200" b="1" dirty="0">
               <a:solidFill>
@@ -3825,8 +3825,8 @@
         </p:nvSpPr>
         <p:spPr>
           <a:xfrm rot="16200000">
-            <a:off x="5703829" y="2464877"/>
-            <a:ext cx="2362201" cy="328045"/>
+            <a:off x="5749995" y="2418710"/>
+            <a:ext cx="2438401" cy="496577"/>
           </a:xfrm>
           <a:prstGeom prst="roundRect">
             <a:avLst/>
@@ -3945,7 +3945,7 @@
         </p:nvSpPr>
         <p:spPr>
           <a:xfrm>
-            <a:off x="2592527" y="4563759"/>
+            <a:off x="2592525" y="4911944"/>
             <a:ext cx="1093635" cy="236841"/>
           </a:xfrm>
           <a:prstGeom prst="rect">
@@ -4038,7 +4038,7 @@
           <a:p>
             <a:pPr algn="ctr"/>
             <a:r>
-              <a:rPr lang="en-US" altLang="zh-CN" sz="1050" b="1" dirty="0" err="1" smtClean="0">
+              <a:rPr lang="en-US" altLang="zh-CN" sz="1050" b="1" dirty="0" err="1">
                 <a:solidFill>
                   <a:schemeClr val="accent3">
                     <a:lumMod val="75000"/>
@@ -4048,7 +4048,7 @@
               <a:t>Task</a:t>
             </a:r>
             <a:r>
-              <a:rPr lang="en-US" sz="1050" b="1" dirty="0" err="1" smtClean="0">
+              <a:rPr lang="en-US" sz="1050" b="1" dirty="0" err="1">
                 <a:solidFill>
                   <a:schemeClr val="accent3">
                     <a:lumMod val="75000"/>
@@ -4108,7 +4108,7 @@
           <a:p>
             <a:pPr algn="ctr"/>
             <a:r>
-              <a:rPr lang="en-US" altLang="zh-CN" sz="1050" b="1" smtClean="0">
+              <a:rPr lang="en-US" altLang="zh-CN" sz="1050" b="1" dirty="0" err="1">
                 <a:solidFill>
                   <a:schemeClr val="accent3">
                     <a:lumMod val="75000"/>
@@ -4118,7 +4118,7 @@
               <a:t>Task</a:t>
             </a:r>
             <a:r>
-              <a:rPr lang="en-US" sz="1050" b="1" smtClean="0">
+              <a:rPr lang="en-US" sz="1050" b="1" dirty="0" err="1">
                 <a:solidFill>
                   <a:schemeClr val="accent3">
                     <a:lumMod val="75000"/>
@@ -4145,7 +4145,7 @@
         </p:nvSpPr>
         <p:spPr>
           <a:xfrm>
-            <a:off x="2592528" y="4966000"/>
+            <a:off x="2602558" y="5293090"/>
             <a:ext cx="1093635" cy="236841"/>
           </a:xfrm>
           <a:prstGeom prst="rect">
@@ -4391,6 +4391,7 @@
         <p:nvCxnSpPr>
           <p:cNvPr id="47" name="Elbow Connector 63"/>
           <p:cNvCxnSpPr>
+            <a:cxnSpLocks/>
             <a:stCxn id="39" idx="2"/>
             <a:endCxn id="36" idx="1"/>
           </p:cNvCxnSpPr>
@@ -4439,8 +4440,8 @@
         </p:nvCxnSpPr>
         <p:spPr>
           <a:xfrm rot="16200000" flipH="1">
-            <a:off x="1597249" y="3686901"/>
-            <a:ext cx="1814155" cy="176401"/>
+            <a:off x="1423155" y="3860995"/>
+            <a:ext cx="2162340" cy="176399"/>
           </a:xfrm>
           <a:prstGeom prst="bentConnector2">
             <a:avLst/>
@@ -4473,14 +4474,15 @@
         <p:nvCxnSpPr>
           <p:cNvPr id="53" name="Elbow Connector 63"/>
           <p:cNvCxnSpPr>
+            <a:cxnSpLocks/>
             <a:endCxn id="38" idx="1"/>
           </p:cNvCxnSpPr>
           <p:nvPr/>
         </p:nvCxnSpPr>
         <p:spPr>
           <a:xfrm rot="16200000" flipH="1">
-            <a:off x="1184119" y="3676012"/>
-            <a:ext cx="2396440" cy="420377"/>
+            <a:off x="1034404" y="3843357"/>
+            <a:ext cx="2705058" cy="431249"/>
           </a:xfrm>
           <a:prstGeom prst="bentConnector2">
             <a:avLst/>
@@ -4763,8 +4765,8 @@
         </p:nvCxnSpPr>
         <p:spPr>
           <a:xfrm rot="5400000">
-            <a:off x="3409976" y="2562187"/>
-            <a:ext cx="2396180" cy="1843807"/>
+            <a:off x="3235883" y="2736278"/>
+            <a:ext cx="2744365" cy="1843809"/>
           </a:xfrm>
           <a:prstGeom prst="bentConnector2">
             <a:avLst/>
@@ -4804,8 +4806,8 @@
         </p:nvCxnSpPr>
         <p:spPr>
           <a:xfrm rot="5400000">
-            <a:off x="3208856" y="2763307"/>
-            <a:ext cx="2798421" cy="1843806"/>
+            <a:off x="3050326" y="2931867"/>
+            <a:ext cx="3125511" cy="1833776"/>
           </a:xfrm>
           <a:prstGeom prst="bentConnector2">
             <a:avLst/>
@@ -4883,8 +4885,8 @@
         </p:nvSpPr>
         <p:spPr>
           <a:xfrm rot="16200000">
-            <a:off x="6213739" y="4560376"/>
-            <a:ext cx="1371599" cy="328045"/>
+            <a:off x="6167247" y="4606867"/>
+            <a:ext cx="1676401" cy="539863"/>
           </a:xfrm>
           <a:prstGeom prst="roundRect">
             <a:avLst/>
@@ -5529,6 +5531,216 @@
           </a:p>
         </p:txBody>
       </p:sp>
+      <p:sp>
+        <p:nvSpPr>
+          <p:cNvPr id="48" name="Rectangle 11"/>
+          <p:cNvSpPr/>
+          <p:nvPr/>
+        </p:nvSpPr>
+        <p:spPr>
+          <a:xfrm>
+            <a:off x="2590799" y="4425322"/>
+            <a:ext cx="1093635" cy="236841"/>
+          </a:xfrm>
+          <a:prstGeom prst="rect">
+            <a:avLst/>
+          </a:prstGeom>
+          <a:ln w="19050">
+            <a:solidFill>
+              <a:schemeClr val="accent3"/>
+            </a:solidFill>
+          </a:ln>
+          <a:effectLst/>
+        </p:spPr>
+        <p:style>
+          <a:lnRef idx="1">
+            <a:schemeClr val="accent3"/>
+          </a:lnRef>
+          <a:fillRef idx="2">
+            <a:schemeClr val="accent3"/>
+          </a:fillRef>
+          <a:effectRef idx="1">
+            <a:schemeClr val="accent3"/>
+          </a:effectRef>
+          <a:fontRef idx="minor">
+            <a:schemeClr val="dk1"/>
+          </a:fontRef>
+        </p:style>
+        <p:txBody>
+          <a:bodyPr rtlCol="0" anchor="ctr"/>
+          <a:lstStyle/>
+          <a:p>
+            <a:pPr algn="ctr"/>
+            <a:r>
+              <a:rPr lang="en-US" altLang="zh-CN" sz="1050" b="1" dirty="0" err="1">
+                <a:solidFill>
+                  <a:schemeClr val="accent3">
+                    <a:lumMod val="75000"/>
+                  </a:schemeClr>
+                </a:solidFill>
+              </a:rPr>
+              <a:t>MenuBar</a:t>
+            </a:r>
+            <a:r>
+              <a:rPr lang="en-US" sz="1050" b="1" dirty="0" err="1">
+                <a:solidFill>
+                  <a:schemeClr val="accent3">
+                    <a:lumMod val="75000"/>
+                  </a:schemeClr>
+                </a:solidFill>
+              </a:rPr>
+              <a:t>Panel</a:t>
+            </a:r>
+            <a:endParaRPr lang="en-SG" sz="1050" b="1" dirty="0">
+              <a:solidFill>
+                <a:schemeClr val="accent3">
+                  <a:lumMod val="75000"/>
+                </a:schemeClr>
+              </a:solidFill>
+            </a:endParaRPr>
+          </a:p>
+        </p:txBody>
+      </p:sp>
+      <p:cxnSp>
+        <p:nvCxnSpPr>
+          <p:cNvPr id="54" name="Elbow Connector 136"/>
+          <p:cNvCxnSpPr>
+            <a:cxnSpLocks/>
+          </p:cNvCxnSpPr>
+          <p:nvPr/>
+        </p:nvCxnSpPr>
+        <p:spPr>
+          <a:xfrm rot="16200000" flipH="1">
+            <a:off x="3438935" y="4405366"/>
+            <a:ext cx="118421" cy="699979"/>
+          </a:xfrm>
+          <a:prstGeom prst="bentConnector2">
+            <a:avLst/>
+          </a:prstGeom>
+          <a:ln w="19050">
+            <a:solidFill>
+              <a:schemeClr val="accent3"/>
+            </a:solidFill>
+            <a:headEnd type="none" w="med" len="med"/>
+            <a:tailEnd type="arrow" w="med" len="med"/>
+          </a:ln>
+          <a:effectLst/>
+        </p:spPr>
+        <p:style>
+          <a:lnRef idx="1">
+            <a:schemeClr val="accent2"/>
+          </a:lnRef>
+          <a:fillRef idx="2">
+            <a:schemeClr val="accent2"/>
+          </a:fillRef>
+          <a:effectRef idx="1">
+            <a:schemeClr val="accent2"/>
+          </a:effectRef>
+          <a:fontRef idx="minor">
+            <a:schemeClr val="dk1"/>
+          </a:fontRef>
+        </p:style>
+      </p:cxnSp>
+      <p:sp>
+        <p:nvSpPr>
+          <p:cNvPr id="56" name="Rectangle 11"/>
+          <p:cNvSpPr/>
+          <p:nvPr/>
+        </p:nvSpPr>
+        <p:spPr>
+          <a:xfrm>
+            <a:off x="3862560" y="4688135"/>
+            <a:ext cx="1040906" cy="236841"/>
+          </a:xfrm>
+          <a:prstGeom prst="rect">
+            <a:avLst/>
+          </a:prstGeom>
+          <a:ln w="19050">
+            <a:solidFill>
+              <a:schemeClr val="accent3"/>
+            </a:solidFill>
+          </a:ln>
+          <a:effectLst/>
+        </p:spPr>
+        <p:style>
+          <a:lnRef idx="1">
+            <a:schemeClr val="accent3"/>
+          </a:lnRef>
+          <a:fillRef idx="2">
+            <a:schemeClr val="accent3"/>
+          </a:fillRef>
+          <a:effectRef idx="1">
+            <a:schemeClr val="accent3"/>
+          </a:effectRef>
+          <a:fontRef idx="minor">
+            <a:schemeClr val="dk1"/>
+          </a:fontRef>
+        </p:style>
+        <p:txBody>
+          <a:bodyPr rtlCol="0" anchor="ctr"/>
+          <a:lstStyle/>
+          <a:p>
+            <a:pPr algn="ctr"/>
+            <a:r>
+              <a:rPr lang="en-US" sz="1050" b="1" dirty="0" err="1">
+                <a:solidFill>
+                  <a:schemeClr val="accent3">
+                    <a:lumMod val="75000"/>
+                  </a:schemeClr>
+                </a:solidFill>
+              </a:rPr>
+              <a:t>MenuCard</a:t>
+            </a:r>
+            <a:endParaRPr lang="en-SG" sz="1050" b="1" dirty="0">
+              <a:solidFill>
+                <a:schemeClr val="accent3">
+                  <a:lumMod val="75000"/>
+                </a:schemeClr>
+              </a:solidFill>
+            </a:endParaRPr>
+          </a:p>
+        </p:txBody>
+      </p:sp>
+      <p:cxnSp>
+        <p:nvCxnSpPr>
+          <p:cNvPr id="58" name="Elbow Connector 63"/>
+          <p:cNvCxnSpPr>
+            <a:cxnSpLocks/>
+          </p:cNvCxnSpPr>
+          <p:nvPr/>
+        </p:nvCxnSpPr>
+        <p:spPr>
+          <a:xfrm rot="16200000" flipH="1">
+            <a:off x="1876405" y="3883910"/>
+            <a:ext cx="1242356" cy="176400"/>
+          </a:xfrm>
+          <a:prstGeom prst="bentConnector2">
+            <a:avLst/>
+          </a:prstGeom>
+          <a:ln w="19050">
+            <a:solidFill>
+              <a:schemeClr val="accent3"/>
+            </a:solidFill>
+            <a:headEnd type="none" w="med" len="med"/>
+            <a:tailEnd type="arrow" w="med" len="med"/>
+          </a:ln>
+          <a:effectLst/>
+        </p:spPr>
+        <p:style>
+          <a:lnRef idx="1">
+            <a:schemeClr val="accent2"/>
+          </a:lnRef>
+          <a:fillRef idx="2">
+            <a:schemeClr val="accent2"/>
+          </a:fillRef>
+          <a:effectRef idx="1">
+            <a:schemeClr val="accent2"/>
+          </a:effectRef>
+          <a:fontRef idx="minor">
+            <a:schemeClr val="dk1"/>
+          </a:fontRef>
+        </p:style>
+      </p:cxnSp>
     </p:spTree>
     <p:extLst>
       <p:ext uri="{BB962C8B-B14F-4D97-AF65-F5344CB8AC3E}">

</xml_diff>